<commit_message>
update introduction and assignments 1 and 2
</commit_message>
<xml_diff>
--- a/scratch-leapmotion/instructions/nl/Scratch-opdracht_01.pptx
+++ b/scratch-leapmotion/instructions/nl/Scratch-opdracht_01.pptx
@@ -5,24 +5,25 @@
     <p:sldMasterId id="2147483648" r:id="rId1"/>
   </p:sldMasterIdLst>
   <p:notesMasterIdLst>
-    <p:notesMasterId r:id="rId14"/>
+    <p:notesMasterId r:id="rId15"/>
   </p:notesMasterIdLst>
   <p:handoutMasterIdLst>
-    <p:handoutMasterId r:id="rId15"/>
+    <p:handoutMasterId r:id="rId16"/>
   </p:handoutMasterIdLst>
   <p:sldIdLst>
     <p:sldId id="256" r:id="rId2"/>
     <p:sldId id="257" r:id="rId3"/>
-    <p:sldId id="259" r:id="rId4"/>
-    <p:sldId id="260" r:id="rId5"/>
-    <p:sldId id="261" r:id="rId6"/>
-    <p:sldId id="262" r:id="rId7"/>
-    <p:sldId id="263" r:id="rId8"/>
-    <p:sldId id="264" r:id="rId9"/>
-    <p:sldId id="265" r:id="rId10"/>
-    <p:sldId id="266" r:id="rId11"/>
-    <p:sldId id="258" r:id="rId12"/>
-    <p:sldId id="267" r:id="rId13"/>
+    <p:sldId id="268" r:id="rId4"/>
+    <p:sldId id="259" r:id="rId5"/>
+    <p:sldId id="260" r:id="rId6"/>
+    <p:sldId id="261" r:id="rId7"/>
+    <p:sldId id="262" r:id="rId8"/>
+    <p:sldId id="263" r:id="rId9"/>
+    <p:sldId id="264" r:id="rId10"/>
+    <p:sldId id="265" r:id="rId11"/>
+    <p:sldId id="266" r:id="rId12"/>
+    <p:sldId id="258" r:id="rId13"/>
+    <p:sldId id="267" r:id="rId14"/>
   </p:sldIdLst>
   <p:sldSz cx="9144000" cy="6858000" type="screen4x3"/>
   <p:notesSz cx="6858000" cy="9144000"/>
@@ -121,6 +122,22 @@
       </a:defRPr>
     </a:lvl9pPr>
   </p:defaultTextStyle>
+  <p:extLst>
+    <p:ext uri="{EFAFB233-063F-42B5-8137-9DF3F51BA10A}">
+      <p15:sldGuideLst xmlns:p15="http://schemas.microsoft.com/office/powerpoint/2012/main">
+        <p15:guide id="1" orient="horz" pos="2160">
+          <p15:clr>
+            <a:srgbClr val="A4A3A4"/>
+          </p15:clr>
+        </p15:guide>
+        <p15:guide id="2" pos="2880">
+          <p15:clr>
+            <a:srgbClr val="A4A3A4"/>
+          </p15:clr>
+        </p15:guide>
+      </p15:sldGuideLst>
+    </p:ext>
+  </p:extLst>
 </p:presentation>
 </file>
 
@@ -206,7 +223,7 @@
           <a:p>
             <a:fld id="{FD5240AD-D0E5-8743-BED0-4875EEDE37D1}" type="datetimeFigureOut">
               <a:rPr lang="en-US" smtClean="0"/>
-              <a:t>09/09/15</a:t>
+              <a:t>4/13/18</a:t>
             </a:fld>
             <a:endParaRPr lang="en-US"/>
           </a:p>
@@ -372,7 +389,7 @@
           <a:p>
             <a:fld id="{59F1AF83-5EC3-2645-9357-E8053F4E6264}" type="datetimeFigureOut">
               <a:rPr lang="en-US" smtClean="0"/>
-              <a:t>09/09/15</a:t>
+              <a:t>4/13/18</a:t>
             </a:fld>
             <a:endParaRPr lang="en-US"/>
           </a:p>
@@ -436,35 +453,35 @@
           <a:p>
             <a:pPr lvl="0"/>
             <a:r>
-              <a:rPr lang="nl-BE" smtClean="0"/>
+              <a:rPr lang="nl-BE"/>
               <a:t>Click to edit Master text styles</a:t>
             </a:r>
           </a:p>
           <a:p>
             <a:pPr lvl="1"/>
             <a:r>
-              <a:rPr lang="nl-BE" smtClean="0"/>
+              <a:rPr lang="nl-BE"/>
               <a:t>Second level</a:t>
             </a:r>
           </a:p>
           <a:p>
             <a:pPr lvl="2"/>
             <a:r>
-              <a:rPr lang="nl-BE" smtClean="0"/>
+              <a:rPr lang="nl-BE"/>
               <a:t>Third level</a:t>
             </a:r>
           </a:p>
           <a:p>
             <a:pPr lvl="3"/>
             <a:r>
-              <a:rPr lang="nl-BE" smtClean="0"/>
+              <a:rPr lang="nl-BE"/>
               <a:t>Fourth level</a:t>
             </a:r>
           </a:p>
           <a:p>
             <a:pPr lvl="4"/>
             <a:r>
-              <a:rPr lang="nl-BE" smtClean="0"/>
+              <a:rPr lang="nl-BE"/>
               <a:t>Fifth level</a:t>
             </a:r>
             <a:endParaRPr lang="en-US"/>
@@ -682,7 +699,7 @@
           <a:lstStyle/>
           <a:p>
             <a:r>
-              <a:rPr lang="nl-BE" smtClean="0"/>
+              <a:rPr lang="nl-BE"/>
               <a:t>Click to edit Master title style</a:t>
             </a:r>
             <a:endParaRPr lang="en-US"/>
@@ -804,7 +821,7 @@
           </a:lstStyle>
           <a:p>
             <a:r>
-              <a:rPr lang="nl-BE" smtClean="0"/>
+              <a:rPr lang="nl-BE"/>
               <a:t>Click to edit Master subtitle style</a:t>
             </a:r>
             <a:endParaRPr lang="en-US"/>
@@ -992,7 +1009,7 @@
           </a:lstStyle>
           <a:p>
             <a:r>
-              <a:rPr lang="nl-BE" sz="1800" dirty="0" smtClean="0">
+              <a:rPr lang="nl-BE" sz="1800" dirty="0">
                 <a:latin typeface="+mn-lt"/>
               </a:rPr>
               <a:t>www.devoxx4kids.com</a:t>
@@ -1058,35 +1075,35 @@
           <a:p>
             <a:pPr lvl="0"/>
             <a:r>
-              <a:rPr lang="nl-BE" dirty="0" smtClean="0"/>
+              <a:rPr lang="nl-BE" dirty="0"/>
               <a:t>Click to edit Master text styles</a:t>
             </a:r>
           </a:p>
           <a:p>
             <a:pPr lvl="1"/>
             <a:r>
-              <a:rPr lang="nl-BE" dirty="0" smtClean="0"/>
+              <a:rPr lang="nl-BE" dirty="0"/>
               <a:t>Second level</a:t>
             </a:r>
           </a:p>
           <a:p>
             <a:pPr lvl="2"/>
             <a:r>
-              <a:rPr lang="nl-BE" dirty="0" smtClean="0"/>
+              <a:rPr lang="nl-BE" dirty="0"/>
               <a:t>Third level</a:t>
             </a:r>
           </a:p>
           <a:p>
             <a:pPr lvl="3"/>
             <a:r>
-              <a:rPr lang="nl-BE" dirty="0" smtClean="0"/>
+              <a:rPr lang="nl-BE" dirty="0"/>
               <a:t>Fourth level</a:t>
             </a:r>
           </a:p>
           <a:p>
             <a:pPr lvl="4"/>
             <a:r>
-              <a:rPr lang="nl-BE" dirty="0" smtClean="0"/>
+              <a:rPr lang="nl-BE" dirty="0"/>
               <a:t>Fifth level</a:t>
             </a:r>
             <a:endParaRPr lang="en-US" dirty="0"/>
@@ -1178,7 +1195,7 @@
           <a:lstStyle/>
           <a:p>
             <a:r>
-              <a:rPr lang="nl-BE" dirty="0" smtClean="0"/>
+              <a:rPr lang="nl-BE" dirty="0"/>
               <a:t>Click to edit Master title style</a:t>
             </a:r>
             <a:endParaRPr lang="en-US" dirty="0"/>
@@ -1246,7 +1263,7 @@
           </a:lstStyle>
           <a:p>
             <a:r>
-              <a:rPr lang="nl-BE" sz="1800" dirty="0" smtClean="0">
+              <a:rPr lang="nl-BE" sz="1800" dirty="0">
                 <a:latin typeface="+mn-lt"/>
               </a:rPr>
               <a:t>www.devoxx4kids.com</a:t>
@@ -1311,7 +1328,7 @@
           <a:lstStyle/>
           <a:p>
             <a:r>
-              <a:rPr lang="nl-BE" dirty="0" smtClean="0"/>
+              <a:rPr lang="nl-BE" dirty="0"/>
               <a:t>Click to edit Master title style</a:t>
             </a:r>
             <a:endParaRPr lang="en-US" dirty="0"/>
@@ -1343,35 +1360,35 @@
           <a:p>
             <a:pPr lvl="0"/>
             <a:r>
-              <a:rPr lang="nl-BE" dirty="0" smtClean="0"/>
+              <a:rPr lang="nl-BE" dirty="0"/>
               <a:t>Click to edit Master text styles</a:t>
             </a:r>
           </a:p>
           <a:p>
             <a:pPr lvl="1"/>
             <a:r>
-              <a:rPr lang="nl-BE" dirty="0" smtClean="0"/>
+              <a:rPr lang="nl-BE" dirty="0"/>
               <a:t>Second level</a:t>
             </a:r>
           </a:p>
           <a:p>
             <a:pPr lvl="2"/>
             <a:r>
-              <a:rPr lang="nl-BE" dirty="0" smtClean="0"/>
+              <a:rPr lang="nl-BE" dirty="0"/>
               <a:t>Third level</a:t>
             </a:r>
           </a:p>
           <a:p>
             <a:pPr lvl="3"/>
             <a:r>
-              <a:rPr lang="nl-BE" dirty="0" smtClean="0"/>
+              <a:rPr lang="nl-BE" dirty="0"/>
               <a:t>Fourth level</a:t>
             </a:r>
           </a:p>
           <a:p>
             <a:pPr lvl="4"/>
             <a:r>
-              <a:rPr lang="nl-BE" dirty="0" smtClean="0"/>
+              <a:rPr lang="nl-BE" dirty="0"/>
               <a:t>Fifth level</a:t>
             </a:r>
             <a:endParaRPr lang="en-US" dirty="0"/>
@@ -1472,7 +1489,7 @@
           </a:lstStyle>
           <a:p>
             <a:r>
-              <a:rPr lang="nl-BE" sz="1800" dirty="0" smtClean="0">
+              <a:rPr lang="nl-BE" sz="1800" dirty="0">
                 <a:latin typeface="+mn-lt"/>
               </a:rPr>
               <a:t>www.devoxx4kids.com</a:t>
@@ -1569,7 +1586,7 @@
           </a:lstStyle>
           <a:p>
             <a:r>
-              <a:rPr lang="nl-BE" smtClean="0"/>
+              <a:rPr lang="nl-BE"/>
               <a:t>Click to edit Master title style</a:t>
             </a:r>
             <a:endParaRPr lang="en-US"/>
@@ -1692,7 +1709,7 @@
           <a:p>
             <a:pPr lvl="0"/>
             <a:r>
-              <a:rPr lang="nl-BE" smtClean="0"/>
+              <a:rPr lang="nl-BE"/>
               <a:t>Click to edit Master text styles</a:t>
             </a:r>
           </a:p>
@@ -1823,7 +1840,7 @@
           </a:lstStyle>
           <a:p>
             <a:r>
-              <a:rPr lang="nl-BE" sz="1800" dirty="0" smtClean="0">
+              <a:rPr lang="nl-BE" sz="1800" dirty="0">
                 <a:latin typeface="+mn-lt"/>
               </a:rPr>
               <a:t>www.devoxx4kids.com</a:t>
@@ -1917,35 +1934,35 @@
           <a:p>
             <a:pPr lvl="0"/>
             <a:r>
-              <a:rPr lang="nl-BE" smtClean="0"/>
+              <a:rPr lang="nl-BE"/>
               <a:t>Click to edit Master text styles</a:t>
             </a:r>
           </a:p>
           <a:p>
             <a:pPr lvl="1"/>
             <a:r>
-              <a:rPr lang="nl-BE" smtClean="0"/>
+              <a:rPr lang="nl-BE"/>
               <a:t>Second level</a:t>
             </a:r>
           </a:p>
           <a:p>
             <a:pPr lvl="2"/>
             <a:r>
-              <a:rPr lang="nl-BE" smtClean="0"/>
+              <a:rPr lang="nl-BE"/>
               <a:t>Third level</a:t>
             </a:r>
           </a:p>
           <a:p>
             <a:pPr lvl="3"/>
             <a:r>
-              <a:rPr lang="nl-BE" smtClean="0"/>
+              <a:rPr lang="nl-BE"/>
               <a:t>Fourth level</a:t>
             </a:r>
           </a:p>
           <a:p>
             <a:pPr lvl="4"/>
             <a:r>
-              <a:rPr lang="nl-BE" smtClean="0"/>
+              <a:rPr lang="nl-BE"/>
               <a:t>Fifth level</a:t>
             </a:r>
             <a:endParaRPr lang="en-US"/>
@@ -2005,35 +2022,35 @@
           <a:p>
             <a:pPr lvl="0"/>
             <a:r>
-              <a:rPr lang="nl-BE" smtClean="0"/>
+              <a:rPr lang="nl-BE"/>
               <a:t>Click to edit Master text styles</a:t>
             </a:r>
           </a:p>
           <a:p>
             <a:pPr lvl="1"/>
             <a:r>
-              <a:rPr lang="nl-BE" smtClean="0"/>
+              <a:rPr lang="nl-BE"/>
               <a:t>Second level</a:t>
             </a:r>
           </a:p>
           <a:p>
             <a:pPr lvl="2"/>
             <a:r>
-              <a:rPr lang="nl-BE" smtClean="0"/>
+              <a:rPr lang="nl-BE"/>
               <a:t>Third level</a:t>
             </a:r>
           </a:p>
           <a:p>
             <a:pPr lvl="3"/>
             <a:r>
-              <a:rPr lang="nl-BE" smtClean="0"/>
+              <a:rPr lang="nl-BE"/>
               <a:t>Fourth level</a:t>
             </a:r>
           </a:p>
           <a:p>
             <a:pPr lvl="4"/>
             <a:r>
-              <a:rPr lang="nl-BE" smtClean="0"/>
+              <a:rPr lang="nl-BE"/>
               <a:t>Fifth level</a:t>
             </a:r>
             <a:endParaRPr lang="en-US"/>
@@ -2125,7 +2142,7 @@
           <a:lstStyle/>
           <a:p>
             <a:r>
-              <a:rPr lang="nl-BE" dirty="0" smtClean="0"/>
+              <a:rPr lang="nl-BE" dirty="0"/>
               <a:t>Click to edit Master title style</a:t>
             </a:r>
             <a:endParaRPr lang="en-US" dirty="0"/>
@@ -2193,7 +2210,7 @@
           </a:lstStyle>
           <a:p>
             <a:r>
-              <a:rPr lang="nl-BE" sz="1800" dirty="0" smtClean="0">
+              <a:rPr lang="nl-BE" sz="1800" dirty="0">
                 <a:latin typeface="+mn-lt"/>
               </a:rPr>
               <a:t>www.devoxx4kids.com</a:t>
@@ -2296,7 +2313,7 @@
           <a:p>
             <a:pPr lvl="0"/>
             <a:r>
-              <a:rPr lang="nl-BE" smtClean="0"/>
+              <a:rPr lang="nl-BE"/>
               <a:t>Click to edit Master text styles</a:t>
             </a:r>
           </a:p>
@@ -2355,35 +2372,35 @@
           <a:p>
             <a:pPr lvl="0"/>
             <a:r>
-              <a:rPr lang="nl-BE" smtClean="0"/>
+              <a:rPr lang="nl-BE"/>
               <a:t>Click to edit Master text styles</a:t>
             </a:r>
           </a:p>
           <a:p>
             <a:pPr lvl="1"/>
             <a:r>
-              <a:rPr lang="nl-BE" smtClean="0"/>
+              <a:rPr lang="nl-BE"/>
               <a:t>Second level</a:t>
             </a:r>
           </a:p>
           <a:p>
             <a:pPr lvl="2"/>
             <a:r>
-              <a:rPr lang="nl-BE" smtClean="0"/>
+              <a:rPr lang="nl-BE"/>
               <a:t>Third level</a:t>
             </a:r>
           </a:p>
           <a:p>
             <a:pPr lvl="3"/>
             <a:r>
-              <a:rPr lang="nl-BE" smtClean="0"/>
+              <a:rPr lang="nl-BE"/>
               <a:t>Fourth level</a:t>
             </a:r>
           </a:p>
           <a:p>
             <a:pPr lvl="4"/>
             <a:r>
-              <a:rPr lang="nl-BE" smtClean="0"/>
+              <a:rPr lang="nl-BE"/>
               <a:t>Fifth level</a:t>
             </a:r>
             <a:endParaRPr lang="en-US"/>
@@ -2452,7 +2469,7 @@
           <a:p>
             <a:pPr lvl="0"/>
             <a:r>
-              <a:rPr lang="nl-BE" smtClean="0"/>
+              <a:rPr lang="nl-BE"/>
               <a:t>Click to edit Master text styles</a:t>
             </a:r>
           </a:p>
@@ -2511,35 +2528,35 @@
           <a:p>
             <a:pPr lvl="0"/>
             <a:r>
-              <a:rPr lang="nl-BE" smtClean="0"/>
+              <a:rPr lang="nl-BE"/>
               <a:t>Click to edit Master text styles</a:t>
             </a:r>
           </a:p>
           <a:p>
             <a:pPr lvl="1"/>
             <a:r>
-              <a:rPr lang="nl-BE" smtClean="0"/>
+              <a:rPr lang="nl-BE"/>
               <a:t>Second level</a:t>
             </a:r>
           </a:p>
           <a:p>
             <a:pPr lvl="2"/>
             <a:r>
-              <a:rPr lang="nl-BE" smtClean="0"/>
+              <a:rPr lang="nl-BE"/>
               <a:t>Third level</a:t>
             </a:r>
           </a:p>
           <a:p>
             <a:pPr lvl="3"/>
             <a:r>
-              <a:rPr lang="nl-BE" smtClean="0"/>
+              <a:rPr lang="nl-BE"/>
               <a:t>Fourth level</a:t>
             </a:r>
           </a:p>
           <a:p>
             <a:pPr lvl="4"/>
             <a:r>
-              <a:rPr lang="nl-BE" smtClean="0"/>
+              <a:rPr lang="nl-BE"/>
               <a:t>Fifth level</a:t>
             </a:r>
             <a:endParaRPr lang="en-US"/>
@@ -2631,7 +2648,7 @@
           <a:lstStyle/>
           <a:p>
             <a:r>
-              <a:rPr lang="nl-BE" dirty="0" smtClean="0"/>
+              <a:rPr lang="nl-BE" dirty="0"/>
               <a:t>Click to edit Master title style</a:t>
             </a:r>
             <a:endParaRPr lang="en-US" dirty="0"/>
@@ -2699,7 +2716,7 @@
           </a:lstStyle>
           <a:p>
             <a:r>
-              <a:rPr lang="nl-BE" sz="1800" dirty="0" smtClean="0">
+              <a:rPr lang="nl-BE" sz="1800" dirty="0">
                 <a:latin typeface="+mn-lt"/>
               </a:rPr>
               <a:t>www.devoxx4kids.com</a:t>
@@ -2825,7 +2842,7 @@
           <a:lstStyle/>
           <a:p>
             <a:r>
-              <a:rPr lang="nl-BE" dirty="0" smtClean="0"/>
+              <a:rPr lang="nl-BE" dirty="0"/>
               <a:t>Click to edit Master title style</a:t>
             </a:r>
             <a:endParaRPr lang="en-US" dirty="0"/>
@@ -2893,7 +2910,7 @@
           </a:lstStyle>
           <a:p>
             <a:r>
-              <a:rPr lang="nl-BE" sz="1800" dirty="0" smtClean="0">
+              <a:rPr lang="nl-BE" sz="1800" dirty="0">
                 <a:latin typeface="+mn-lt"/>
               </a:rPr>
               <a:t>www.devoxx4kids.com</a:t>
@@ -3056,7 +3073,7 @@
           </a:lstStyle>
           <a:p>
             <a:r>
-              <a:rPr lang="nl-BE" sz="1800" dirty="0" smtClean="0">
+              <a:rPr lang="nl-BE" sz="1800" dirty="0">
                 <a:latin typeface="+mn-lt"/>
               </a:rPr>
               <a:t>www.devoxx4kids.com</a:t>
@@ -3125,7 +3142,7 @@
           </a:lstStyle>
           <a:p>
             <a:r>
-              <a:rPr lang="nl-BE" dirty="0" smtClean="0"/>
+              <a:rPr lang="nl-BE" dirty="0"/>
               <a:t>Click to edit Master title style</a:t>
             </a:r>
             <a:endParaRPr lang="en-US" dirty="0"/>
@@ -3185,35 +3202,35 @@
           <a:p>
             <a:pPr lvl="0"/>
             <a:r>
-              <a:rPr lang="nl-BE" smtClean="0"/>
+              <a:rPr lang="nl-BE"/>
               <a:t>Click to edit Master text styles</a:t>
             </a:r>
           </a:p>
           <a:p>
             <a:pPr lvl="1"/>
             <a:r>
-              <a:rPr lang="nl-BE" smtClean="0"/>
+              <a:rPr lang="nl-BE"/>
               <a:t>Second level</a:t>
             </a:r>
           </a:p>
           <a:p>
             <a:pPr lvl="2"/>
             <a:r>
-              <a:rPr lang="nl-BE" smtClean="0"/>
+              <a:rPr lang="nl-BE"/>
               <a:t>Third level</a:t>
             </a:r>
           </a:p>
           <a:p>
             <a:pPr lvl="3"/>
             <a:r>
-              <a:rPr lang="nl-BE" smtClean="0"/>
+              <a:rPr lang="nl-BE"/>
               <a:t>Fourth level</a:t>
             </a:r>
           </a:p>
           <a:p>
             <a:pPr lvl="4"/>
             <a:r>
-              <a:rPr lang="nl-BE" smtClean="0"/>
+              <a:rPr lang="nl-BE"/>
               <a:t>Fifth level</a:t>
             </a:r>
             <a:endParaRPr lang="en-US"/>
@@ -3282,7 +3299,7 @@
           <a:p>
             <a:pPr lvl="0"/>
             <a:r>
-              <a:rPr lang="nl-BE" dirty="0" smtClean="0"/>
+              <a:rPr lang="nl-BE" dirty="0"/>
               <a:t>Click to edit Master text styles</a:t>
             </a:r>
           </a:p>
@@ -3410,7 +3427,7 @@
           </a:lstStyle>
           <a:p>
             <a:r>
-              <a:rPr lang="nl-BE" sz="1800" dirty="0" smtClean="0">
+              <a:rPr lang="nl-BE" sz="1800" dirty="0">
                 <a:latin typeface="+mn-lt"/>
               </a:rPr>
               <a:t>www.devoxx4kids.com</a:t>
@@ -3479,7 +3496,7 @@
           </a:lstStyle>
           <a:p>
             <a:r>
-              <a:rPr lang="nl-BE" dirty="0" smtClean="0"/>
+              <a:rPr lang="nl-BE" dirty="0"/>
               <a:t>Click to edit Master title style</a:t>
             </a:r>
             <a:endParaRPr lang="en-US" dirty="0"/>
@@ -3612,7 +3629,7 @@
           <a:p>
             <a:pPr lvl="0"/>
             <a:r>
-              <a:rPr lang="nl-BE" smtClean="0"/>
+              <a:rPr lang="nl-BE"/>
               <a:t>Click to edit Master text styles</a:t>
             </a:r>
           </a:p>
@@ -3740,7 +3757,7 @@
           </a:lstStyle>
           <a:p>
             <a:r>
-              <a:rPr lang="nl-BE" sz="1800" dirty="0" smtClean="0">
+              <a:rPr lang="nl-BE" sz="1800" dirty="0">
                 <a:latin typeface="+mn-lt"/>
               </a:rPr>
               <a:t>www.devoxx4kids.com</a:t>
@@ -4109,7 +4126,7 @@
           <a:noFill/>
           <a:extLst>
             <a:ext uri="{909E8E84-426E-40dd-AFC4-6F175D3DCCD1}">
-              <a14:hiddenFill xmlns:a14="http://schemas.microsoft.com/office/drawing/2010/main">
+              <a14:hiddenFill xmlns:a14="http://schemas.microsoft.com/office/drawing/2010/main" xmlns="">
                 <a:solidFill>
                   <a:srgbClr val="FFFFFF"/>
                 </a:solidFill>
@@ -4150,7 +4167,7 @@
           <a:noFill/>
           <a:extLst>
             <a:ext uri="{909E8E84-426E-40dd-AFC4-6F175D3DCCD1}">
-              <a14:hiddenFill xmlns:a14="http://schemas.microsoft.com/office/drawing/2010/main">
+              <a14:hiddenFill xmlns:a14="http://schemas.microsoft.com/office/drawing/2010/main" xmlns="">
                 <a:solidFill>
                   <a:srgbClr val="FFFFFF"/>
                 </a:solidFill>
@@ -4175,17 +4192,16 @@
           <a:lstStyle/>
           <a:p>
             <a:r>
-              <a:rPr lang="nl-NL" dirty="0" smtClean="0"/>
+              <a:rPr lang="nl-NL" dirty="0"/>
               <a:t>Programmeren</a:t>
             </a:r>
             <a:br>
-              <a:rPr lang="nl-NL" dirty="0" smtClean="0"/>
+              <a:rPr lang="nl-NL" dirty="0"/>
             </a:br>
             <a:r>
-              <a:rPr lang="nl-NL" dirty="0" smtClean="0"/>
+              <a:rPr lang="nl-NL" dirty="0"/>
               <a:t>Opdracht 1</a:t>
             </a:r>
-            <a:endParaRPr lang="nl-NL" dirty="0"/>
           </a:p>
         </p:txBody>
       </p:sp>
@@ -4199,13 +4215,6 @@
   <p:clrMapOvr>
     <a:masterClrMapping/>
   </p:clrMapOvr>
-  <p:timing>
-    <p:tnLst>
-      <p:par>
-        <p:cTn xmlns:p14="http://schemas.microsoft.com/office/powerpoint/2010/main" id="1" dur="indefinite" restart="never" nodeType="tmRoot"/>
-      </p:par>
-    </p:tnLst>
-  </p:timing>
 </p:sld>
 </file>
 
@@ -4248,30 +4257,19 @@
           <a:p>
             <a:pPr algn="l"/>
             <a:r>
-              <a:rPr lang="en-US" dirty="0" err="1" smtClean="0">
+              <a:rPr lang="en-US" dirty="0" err="1">
                 <a:latin typeface="Comic Sans MS"/>
                 <a:cs typeface="Comic Sans MS"/>
               </a:rPr>
               <a:t>Opdracht</a:t>
             </a:r>
             <a:r>
-              <a:rPr lang="en-US" dirty="0" smtClean="0">
-                <a:latin typeface="Comic Sans MS"/>
-                <a:cs typeface="Comic Sans MS"/>
-              </a:rPr>
-              <a:t> 1</a:t>
-            </a:r>
-            <a:r>
-              <a:rPr lang="en-US" dirty="0" smtClean="0">
-                <a:latin typeface="Comic Sans MS"/>
-                <a:cs typeface="Comic Sans MS"/>
-              </a:rPr>
-              <a:t> </a:t>
-            </a:r>
-            <a:endParaRPr lang="en-US" dirty="0">
-              <a:latin typeface="Comic Sans MS"/>
-              <a:cs typeface="Comic Sans MS"/>
-            </a:endParaRPr>
+              <a:rPr lang="en-US" dirty="0">
+                <a:latin typeface="Comic Sans MS"/>
+                <a:cs typeface="Comic Sans MS"/>
+              </a:rPr>
+              <a:t> 1 </a:t>
+            </a:r>
           </a:p>
         </p:txBody>
       </p:sp>
@@ -4328,8 +4326,8 @@
         </p:nvSpPr>
         <p:spPr>
           <a:xfrm>
-            <a:off x="991810" y="1911049"/>
-            <a:ext cx="4620380" cy="923330"/>
+            <a:off x="471714" y="1911048"/>
+            <a:ext cx="3229429" cy="2862323"/>
           </a:xfrm>
           <a:prstGeom prst="rect">
             <a:avLst/>
@@ -4343,11 +4341,25 @@
           <a:lstStyle/>
           <a:p>
             <a:r>
-              <a:rPr lang="nl-NL" dirty="0" smtClean="0">
-                <a:latin typeface="Comic Sans MS"/>
-                <a:cs typeface="Comic Sans MS"/>
-              </a:rPr>
-              <a:t>Bij draaistijl klik je op de dubbele pijl</a:t>
+              <a:rPr lang="nl-NL" dirty="0">
+                <a:latin typeface="Comic Sans MS"/>
+                <a:cs typeface="Comic Sans MS"/>
+              </a:rPr>
+              <a:t>We moeten nu nog alleen zorgen dat de </a:t>
+            </a:r>
+            <a:r>
+              <a:rPr lang="nl-NL" dirty="0" err="1">
+                <a:latin typeface="Comic Sans MS"/>
+                <a:cs typeface="Comic Sans MS"/>
+              </a:rPr>
+              <a:t>sprite</a:t>
+            </a:r>
+            <a:r>
+              <a:rPr lang="nl-NL" dirty="0">
+                <a:latin typeface="Comic Sans MS"/>
+                <a:cs typeface="Comic Sans MS"/>
+              </a:rPr>
+              <a:t> op de juiste manier omdraait.</a:t>
             </a:r>
           </a:p>
           <a:p>
@@ -4357,16 +4369,79 @@
             </a:endParaRPr>
           </a:p>
           <a:p>
+            <a:r>
+              <a:rPr lang="nl-NL" dirty="0">
+                <a:latin typeface="Comic Sans MS"/>
+                <a:cs typeface="Comic Sans MS"/>
+              </a:rPr>
+              <a:t>Klik op het blauwe i-</a:t>
+            </a:r>
+            <a:r>
+              <a:rPr lang="nl-NL" dirty="0" err="1">
+                <a:latin typeface="Comic Sans MS"/>
+                <a:cs typeface="Comic Sans MS"/>
+              </a:rPr>
+              <a:t>tje</a:t>
+            </a:r>
+            <a:r>
+              <a:rPr lang="nl-NL" dirty="0">
+                <a:latin typeface="Comic Sans MS"/>
+                <a:cs typeface="Comic Sans MS"/>
+              </a:rPr>
+              <a:t> naast de </a:t>
+            </a:r>
+            <a:r>
+              <a:rPr lang="nl-NL" dirty="0" err="1">
+                <a:latin typeface="Comic Sans MS"/>
+                <a:cs typeface="Comic Sans MS"/>
+              </a:rPr>
+              <a:t>sprite</a:t>
+            </a:r>
+            <a:r>
+              <a:rPr lang="nl-NL" dirty="0">
+                <a:latin typeface="Comic Sans MS"/>
+                <a:cs typeface="Comic Sans MS"/>
+              </a:rPr>
+              <a:t> in het </a:t>
+            </a:r>
+            <a:r>
+              <a:rPr lang="nl-NL" dirty="0" err="1">
+                <a:latin typeface="Comic Sans MS"/>
+                <a:cs typeface="Comic Sans MS"/>
+              </a:rPr>
+              <a:t>sprite</a:t>
+            </a:r>
+            <a:r>
+              <a:rPr lang="nl-NL" dirty="0">
+                <a:latin typeface="Comic Sans MS"/>
+                <a:cs typeface="Comic Sans MS"/>
+              </a:rPr>
+              <a:t> scherm.</a:t>
+            </a:r>
+          </a:p>
+          <a:p>
             <a:endParaRPr lang="nl-NL" dirty="0">
               <a:latin typeface="Comic Sans MS"/>
               <a:cs typeface="Comic Sans MS"/>
             </a:endParaRPr>
           </a:p>
+          <a:p>
+            <a:endParaRPr lang="nl-NL" dirty="0">
+              <a:latin typeface="Comic Sans MS"/>
+              <a:cs typeface="Comic Sans MS"/>
+            </a:endParaRPr>
+          </a:p>
+          <a:p>
+            <a:endParaRPr lang="nl-NL" dirty="0">
+              <a:latin typeface="Comic Sans MS"/>
+              <a:cs typeface="Comic Sans MS"/>
+            </a:endParaRPr>
+          </a:p>
         </p:txBody>
       </p:sp>
       <p:pic>
         <p:nvPicPr>
-          <p:cNvPr id="8" name="Content Placeholder 7" descr="Screen Shot 2015-09-09 at 21.56.11.png"/>
+          <p:cNvPr id="6" name="Content Placeholder 5" descr="Screen Shot 2015-09-09 at 21.55.50.png"/>
           <p:cNvPicPr>
             <a:picLocks noGrp="1" noChangeAspect="1"/>
           </p:cNvPicPr>
@@ -4382,77 +4457,26 @@
               </a:ext>
             </a:extLst>
           </a:blip>
-          <a:srcRect l="-988" r="-1296"/>
+          <a:srcRect l="-955" r="-464"/>
           <a:stretch/>
         </p:blipFill>
         <p:spPr>
           <a:xfrm>
-            <a:off x="1676458" y="2576286"/>
-            <a:ext cx="6965248" cy="2642733"/>
+            <a:off x="3580189" y="1911048"/>
+            <a:ext cx="5285619" cy="2376639"/>
           </a:xfrm>
         </p:spPr>
       </p:pic>
-      <p:sp>
-        <p:nvSpPr>
-          <p:cNvPr id="9" name="Rounded Rectangle 8"/>
-          <p:cNvSpPr/>
-          <p:nvPr/>
-        </p:nvSpPr>
-        <p:spPr>
-          <a:xfrm>
-            <a:off x="6019800" y="3870477"/>
-            <a:ext cx="644676" cy="411238"/>
-          </a:xfrm>
-          <a:prstGeom prst="roundRect">
-            <a:avLst/>
-          </a:prstGeom>
-          <a:noFill/>
-          <a:ln w="76200" cmpd="sng">
-            <a:solidFill>
-              <a:schemeClr val="accent6"/>
-            </a:solidFill>
-          </a:ln>
-        </p:spPr>
-        <p:style>
-          <a:lnRef idx="1">
-            <a:schemeClr val="accent1"/>
-          </a:lnRef>
-          <a:fillRef idx="3">
-            <a:schemeClr val="accent1"/>
-          </a:fillRef>
-          <a:effectRef idx="2">
-            <a:schemeClr val="accent1"/>
-          </a:effectRef>
-          <a:fontRef idx="minor">
-            <a:schemeClr val="lt1"/>
-          </a:fontRef>
-        </p:style>
-        <p:txBody>
-          <a:bodyPr rtlCol="0" anchor="ctr"/>
-          <a:lstStyle/>
-          <a:p>
-            <a:pPr algn="ctr"/>
-            <a:endParaRPr lang="nl-NL"/>
-          </a:p>
-        </p:txBody>
-      </p:sp>
     </p:spTree>
     <p:extLst>
       <p:ext uri="{BB962C8B-B14F-4D97-AF65-F5344CB8AC3E}">
-        <p14:creationId xmlns:p14="http://schemas.microsoft.com/office/powerpoint/2010/main" val="1728878242"/>
+        <p14:creationId xmlns:p14="http://schemas.microsoft.com/office/powerpoint/2010/main" val="3014098830"/>
       </p:ext>
     </p:extLst>
   </p:cSld>
   <p:clrMapOvr>
     <a:masterClrMapping/>
   </p:clrMapOvr>
-  <p:timing>
-    <p:tnLst>
-      <p:par>
-        <p:cTn xmlns:p14="http://schemas.microsoft.com/office/powerpoint/2010/main" id="1" dur="indefinite" restart="never" nodeType="tmRoot"/>
-      </p:par>
-    </p:tnLst>
-  </p:timing>
 </p:sld>
 </file>
 
@@ -4495,30 +4519,19 @@
           <a:p>
             <a:pPr algn="l"/>
             <a:r>
-              <a:rPr lang="en-US" dirty="0" err="1" smtClean="0">
+              <a:rPr lang="en-US" dirty="0" err="1">
                 <a:latin typeface="Comic Sans MS"/>
                 <a:cs typeface="Comic Sans MS"/>
               </a:rPr>
               <a:t>Opdracht</a:t>
             </a:r>
             <a:r>
-              <a:rPr lang="en-US" dirty="0" smtClean="0">
-                <a:latin typeface="Comic Sans MS"/>
-                <a:cs typeface="Comic Sans MS"/>
-              </a:rPr>
-              <a:t> 1</a:t>
-            </a:r>
-            <a:r>
-              <a:rPr lang="en-US" dirty="0" smtClean="0">
-                <a:latin typeface="Comic Sans MS"/>
-                <a:cs typeface="Comic Sans MS"/>
-              </a:rPr>
-              <a:t> </a:t>
-            </a:r>
-            <a:endParaRPr lang="en-US" dirty="0">
-              <a:latin typeface="Comic Sans MS"/>
-              <a:cs typeface="Comic Sans MS"/>
-            </a:endParaRPr>
+              <a:rPr lang="en-US" dirty="0">
+                <a:latin typeface="Comic Sans MS"/>
+                <a:cs typeface="Comic Sans MS"/>
+              </a:rPr>
+              <a:t> 1 </a:t>
+            </a:r>
           </a:p>
         </p:txBody>
       </p:sp>
@@ -4567,9 +4580,53 @@
           </a:p>
         </p:txBody>
       </p:sp>
+      <p:sp>
+        <p:nvSpPr>
+          <p:cNvPr id="7" name="TextBox 6"/>
+          <p:cNvSpPr txBox="1"/>
+          <p:nvPr/>
+        </p:nvSpPr>
+        <p:spPr>
+          <a:xfrm>
+            <a:off x="991810" y="1911049"/>
+            <a:ext cx="4620380" cy="923330"/>
+          </a:xfrm>
+          <a:prstGeom prst="rect">
+            <a:avLst/>
+          </a:prstGeom>
+          <a:noFill/>
+        </p:spPr>
+        <p:txBody>
+          <a:bodyPr wrap="square" rtlCol="0">
+            <a:spAutoFit/>
+          </a:bodyPr>
+          <a:lstStyle/>
+          <a:p>
+            <a:r>
+              <a:rPr lang="nl-NL" dirty="0">
+                <a:latin typeface="Comic Sans MS"/>
+                <a:cs typeface="Comic Sans MS"/>
+              </a:rPr>
+              <a:t>Bij draaistijl klik je op de dubbele pijl</a:t>
+            </a:r>
+          </a:p>
+          <a:p>
+            <a:endParaRPr lang="nl-NL" dirty="0">
+              <a:latin typeface="Comic Sans MS"/>
+              <a:cs typeface="Comic Sans MS"/>
+            </a:endParaRPr>
+          </a:p>
+          <a:p>
+            <a:endParaRPr lang="nl-NL" dirty="0">
+              <a:latin typeface="Comic Sans MS"/>
+              <a:cs typeface="Comic Sans MS"/>
+            </a:endParaRPr>
+          </a:p>
+        </p:txBody>
+      </p:sp>
       <p:pic>
         <p:nvPicPr>
-          <p:cNvPr id="6" name="Content Placeholder 5" descr="Screen Shot 2015-09-09 at 22.33.17.png"/>
+          <p:cNvPr id="8" name="Content Placeholder 7" descr="Screen Shot 2015-09-09 at 21.56.11.png"/>
           <p:cNvPicPr>
             <a:picLocks noGrp="1" noChangeAspect="1"/>
           </p:cNvPicPr>
@@ -4577,7 +4634,7 @@
             <p:ph idx="1"/>
           </p:nvPr>
         </p:nvPicPr>
-        <p:blipFill>
+        <p:blipFill rotWithShape="1">
           <a:blip r:embed="rId2">
             <a:extLst>
               <a:ext uri="{28A0092B-C50C-407E-A947-70E740481C1C}">
@@ -4585,28 +4642,26 @@
               </a:ext>
             </a:extLst>
           </a:blip>
-          <a:srcRect t="6673" b="6673"/>
-          <a:stretch>
-            <a:fillRect/>
-          </a:stretch>
+          <a:srcRect l="-988" r="-1296"/>
+          <a:stretch/>
         </p:blipFill>
         <p:spPr>
           <a:xfrm>
-            <a:off x="1187441" y="2426368"/>
-            <a:ext cx="6727371" cy="3699795"/>
+            <a:off x="1676458" y="2576286"/>
+            <a:ext cx="6965248" cy="2642733"/>
           </a:xfrm>
         </p:spPr>
       </p:pic>
       <p:sp>
         <p:nvSpPr>
-          <p:cNvPr id="7" name="Rounded Rectangle 6"/>
+          <p:cNvPr id="9" name="Rounded Rectangle 8"/>
           <p:cNvSpPr/>
           <p:nvPr/>
         </p:nvSpPr>
         <p:spPr>
           <a:xfrm>
-            <a:off x="3124200" y="2417929"/>
-            <a:ext cx="568476" cy="391822"/>
+            <a:off x="6019800" y="3870477"/>
+            <a:ext cx="644676" cy="411238"/>
           </a:xfrm>
           <a:prstGeom prst="roundRect">
             <a:avLst/>
@@ -4641,73 +4696,16 @@
           </a:p>
         </p:txBody>
       </p:sp>
-      <p:sp>
-        <p:nvSpPr>
-          <p:cNvPr id="8" name="TextBox 7"/>
-          <p:cNvSpPr txBox="1"/>
-          <p:nvPr/>
-        </p:nvSpPr>
-        <p:spPr>
-          <a:xfrm>
-            <a:off x="747085" y="1390952"/>
-            <a:ext cx="7383682" cy="646331"/>
-          </a:xfrm>
-          <a:prstGeom prst="rect">
-            <a:avLst/>
-          </a:prstGeom>
-          <a:noFill/>
-        </p:spPr>
-        <p:txBody>
-          <a:bodyPr wrap="square" rtlCol="0">
-            <a:spAutoFit/>
-          </a:bodyPr>
-          <a:lstStyle/>
-          <a:p>
-            <a:r>
-              <a:rPr lang="nl-NL" dirty="0" smtClean="0">
-                <a:latin typeface="Comic Sans MS"/>
-                <a:cs typeface="Comic Sans MS"/>
-              </a:rPr>
-              <a:t>Klik nu op de groene vlag en gebruik pijltje naar links en rechts om </a:t>
-            </a:r>
-            <a:r>
-              <a:rPr lang="nl-NL" dirty="0" err="1" smtClean="0">
-                <a:latin typeface="Comic Sans MS"/>
-                <a:cs typeface="Comic Sans MS"/>
-              </a:rPr>
-              <a:t>sprite</a:t>
-            </a:r>
-            <a:r>
-              <a:rPr lang="nl-NL" dirty="0" smtClean="0">
-                <a:latin typeface="Comic Sans MS"/>
-                <a:cs typeface="Comic Sans MS"/>
-              </a:rPr>
-              <a:t> te laten bewegen</a:t>
-            </a:r>
-            <a:endParaRPr lang="nl-NL" dirty="0">
-              <a:latin typeface="Comic Sans MS"/>
-              <a:cs typeface="Comic Sans MS"/>
-            </a:endParaRPr>
-          </a:p>
-        </p:txBody>
-      </p:sp>
     </p:spTree>
     <p:extLst>
       <p:ext uri="{BB962C8B-B14F-4D97-AF65-F5344CB8AC3E}">
-        <p14:creationId xmlns:p14="http://schemas.microsoft.com/office/powerpoint/2010/main" val="1666396418"/>
+        <p14:creationId xmlns:p14="http://schemas.microsoft.com/office/powerpoint/2010/main" val="1728878242"/>
       </p:ext>
     </p:extLst>
   </p:cSld>
   <p:clrMapOvr>
     <a:masterClrMapping/>
   </p:clrMapOvr>
-  <p:timing>
-    <p:tnLst>
-      <p:par>
-        <p:cTn xmlns:p14="http://schemas.microsoft.com/office/powerpoint/2010/main" id="1" dur="indefinite" restart="never" nodeType="tmRoot"/>
-      </p:par>
-    </p:tnLst>
-  </p:timing>
 </p:sld>
 </file>
 
@@ -4750,30 +4748,19 @@
           <a:p>
             <a:pPr algn="l"/>
             <a:r>
-              <a:rPr lang="en-US" dirty="0" err="1" smtClean="0">
+              <a:rPr lang="en-US" dirty="0" err="1">
                 <a:latin typeface="Comic Sans MS"/>
                 <a:cs typeface="Comic Sans MS"/>
               </a:rPr>
               <a:t>Opdracht</a:t>
             </a:r>
             <a:r>
-              <a:rPr lang="en-US" dirty="0" smtClean="0">
-                <a:latin typeface="Comic Sans MS"/>
-                <a:cs typeface="Comic Sans MS"/>
-              </a:rPr>
-              <a:t> 1</a:t>
-            </a:r>
-            <a:r>
-              <a:rPr lang="en-US" dirty="0" smtClean="0">
-                <a:latin typeface="Comic Sans MS"/>
-                <a:cs typeface="Comic Sans MS"/>
-              </a:rPr>
-              <a:t> </a:t>
-            </a:r>
-            <a:endParaRPr lang="en-US" dirty="0">
-              <a:latin typeface="Comic Sans MS"/>
-              <a:cs typeface="Comic Sans MS"/>
-            </a:endParaRPr>
+              <a:rPr lang="en-US" dirty="0">
+                <a:latin typeface="Comic Sans MS"/>
+                <a:cs typeface="Comic Sans MS"/>
+              </a:rPr>
+              <a:t> 1 </a:t>
+            </a:r>
           </a:p>
         </p:txBody>
       </p:sp>
@@ -4824,7 +4811,7 @@
       </p:sp>
       <p:pic>
         <p:nvPicPr>
-          <p:cNvPr id="9" name="Content Placeholder 8" descr="Screen Shot 2015-09-09 at 22.38.00.png"/>
+          <p:cNvPr id="6" name="Content Placeholder 5" descr="Screen Shot 2015-09-09 at 22.33.17.png"/>
           <p:cNvPicPr>
             <a:picLocks noGrp="1" noChangeAspect="1"/>
           </p:cNvPicPr>
@@ -4847,6 +4834,239 @@
         </p:blipFill>
         <p:spPr>
           <a:xfrm>
+            <a:off x="1187441" y="2426368"/>
+            <a:ext cx="6727371" cy="3699795"/>
+          </a:xfrm>
+        </p:spPr>
+      </p:pic>
+      <p:sp>
+        <p:nvSpPr>
+          <p:cNvPr id="7" name="Rounded Rectangle 6"/>
+          <p:cNvSpPr/>
+          <p:nvPr/>
+        </p:nvSpPr>
+        <p:spPr>
+          <a:xfrm>
+            <a:off x="3124200" y="2417929"/>
+            <a:ext cx="568476" cy="391822"/>
+          </a:xfrm>
+          <a:prstGeom prst="roundRect">
+            <a:avLst/>
+          </a:prstGeom>
+          <a:noFill/>
+          <a:ln w="76200" cmpd="sng">
+            <a:solidFill>
+              <a:schemeClr val="accent6"/>
+            </a:solidFill>
+          </a:ln>
+        </p:spPr>
+        <p:style>
+          <a:lnRef idx="1">
+            <a:schemeClr val="accent1"/>
+          </a:lnRef>
+          <a:fillRef idx="3">
+            <a:schemeClr val="accent1"/>
+          </a:fillRef>
+          <a:effectRef idx="2">
+            <a:schemeClr val="accent1"/>
+          </a:effectRef>
+          <a:fontRef idx="minor">
+            <a:schemeClr val="lt1"/>
+          </a:fontRef>
+        </p:style>
+        <p:txBody>
+          <a:bodyPr rtlCol="0" anchor="ctr"/>
+          <a:lstStyle/>
+          <a:p>
+            <a:pPr algn="ctr"/>
+            <a:endParaRPr lang="nl-NL"/>
+          </a:p>
+        </p:txBody>
+      </p:sp>
+      <p:sp>
+        <p:nvSpPr>
+          <p:cNvPr id="8" name="TextBox 7"/>
+          <p:cNvSpPr txBox="1"/>
+          <p:nvPr/>
+        </p:nvSpPr>
+        <p:spPr>
+          <a:xfrm>
+            <a:off x="747085" y="1390952"/>
+            <a:ext cx="7383682" cy="646331"/>
+          </a:xfrm>
+          <a:prstGeom prst="rect">
+            <a:avLst/>
+          </a:prstGeom>
+          <a:noFill/>
+        </p:spPr>
+        <p:txBody>
+          <a:bodyPr wrap="square" rtlCol="0">
+            <a:spAutoFit/>
+          </a:bodyPr>
+          <a:lstStyle/>
+          <a:p>
+            <a:r>
+              <a:rPr lang="nl-NL" dirty="0">
+                <a:latin typeface="Comic Sans MS"/>
+                <a:cs typeface="Comic Sans MS"/>
+              </a:rPr>
+              <a:t>Klik nu op de groene vlag en gebruik pijltje naar links en rechts om </a:t>
+            </a:r>
+            <a:r>
+              <a:rPr lang="nl-NL" dirty="0" err="1">
+                <a:latin typeface="Comic Sans MS"/>
+                <a:cs typeface="Comic Sans MS"/>
+              </a:rPr>
+              <a:t>sprite</a:t>
+            </a:r>
+            <a:r>
+              <a:rPr lang="nl-NL" dirty="0">
+                <a:latin typeface="Comic Sans MS"/>
+                <a:cs typeface="Comic Sans MS"/>
+              </a:rPr>
+              <a:t> te laten bewegen</a:t>
+            </a:r>
+          </a:p>
+        </p:txBody>
+      </p:sp>
+    </p:spTree>
+    <p:extLst>
+      <p:ext uri="{BB962C8B-B14F-4D97-AF65-F5344CB8AC3E}">
+        <p14:creationId xmlns:p14="http://schemas.microsoft.com/office/powerpoint/2010/main" val="1666396418"/>
+      </p:ext>
+    </p:extLst>
+  </p:cSld>
+  <p:clrMapOvr>
+    <a:masterClrMapping/>
+  </p:clrMapOvr>
+</p:sld>
+</file>
+
+<file path=ppt/slides/slide13.xml><?xml version="1.0" encoding="utf-8"?>
+<p:sld xmlns:a="http://schemas.openxmlformats.org/drawingml/2006/main" xmlns:r="http://schemas.openxmlformats.org/officeDocument/2006/relationships" xmlns:p="http://schemas.openxmlformats.org/presentationml/2006/main">
+  <p:cSld>
+    <p:spTree>
+      <p:nvGrpSpPr>
+        <p:cNvPr id="1" name=""/>
+        <p:cNvGrpSpPr/>
+        <p:nvPr/>
+      </p:nvGrpSpPr>
+      <p:grpSpPr>
+        <a:xfrm>
+          <a:off x="0" y="0"/>
+          <a:ext cx="0" cy="0"/>
+          <a:chOff x="0" y="0"/>
+          <a:chExt cx="0" cy="0"/>
+        </a:xfrm>
+      </p:grpSpPr>
+      <p:sp>
+        <p:nvSpPr>
+          <p:cNvPr id="2" name="Title 1"/>
+          <p:cNvSpPr>
+            <a:spLocks noGrp="1"/>
+          </p:cNvSpPr>
+          <p:nvPr>
+            <p:ph type="title"/>
+          </p:nvPr>
+        </p:nvSpPr>
+        <p:spPr>
+          <a:xfrm>
+            <a:off x="2983570" y="504447"/>
+            <a:ext cx="5882239" cy="886505"/>
+          </a:xfrm>
+        </p:spPr>
+        <p:txBody>
+          <a:bodyPr/>
+          <a:lstStyle/>
+          <a:p>
+            <a:pPr algn="l"/>
+            <a:r>
+              <a:rPr lang="en-US" dirty="0" err="1">
+                <a:latin typeface="Comic Sans MS"/>
+                <a:cs typeface="Comic Sans MS"/>
+              </a:rPr>
+              <a:t>Opdracht</a:t>
+            </a:r>
+            <a:r>
+              <a:rPr lang="en-US" dirty="0">
+                <a:latin typeface="Comic Sans MS"/>
+                <a:cs typeface="Comic Sans MS"/>
+              </a:rPr>
+              <a:t> 1 </a:t>
+            </a:r>
+          </a:p>
+        </p:txBody>
+      </p:sp>
+      <p:sp>
+        <p:nvSpPr>
+          <p:cNvPr id="4" name="Slide Number Placeholder 3"/>
+          <p:cNvSpPr>
+            <a:spLocks noGrp="1"/>
+          </p:cNvSpPr>
+          <p:nvPr>
+            <p:ph type="sldNum" sz="quarter" idx="12"/>
+          </p:nvPr>
+        </p:nvSpPr>
+        <p:spPr/>
+        <p:txBody>
+          <a:bodyPr/>
+          <a:lstStyle/>
+          <a:p>
+            <a:pPr algn="r"/>
+            <a:fld id="{6C0001A9-357E-7541-840E-1F18FD9D64CA}" type="slidenum">
+              <a:rPr lang="en-US" smtClean="0"/>
+              <a:pPr algn="r"/>
+              <a:t>13</a:t>
+            </a:fld>
+            <a:endParaRPr lang="en-US" dirty="0"/>
+          </a:p>
+        </p:txBody>
+      </p:sp>
+      <p:sp>
+        <p:nvSpPr>
+          <p:cNvPr id="5" name="Footer Placeholder 4"/>
+          <p:cNvSpPr>
+            <a:spLocks noGrp="1"/>
+          </p:cNvSpPr>
+          <p:nvPr>
+            <p:ph type="ftr" sz="quarter" idx="11"/>
+          </p:nvPr>
+        </p:nvSpPr>
+        <p:spPr/>
+        <p:txBody>
+          <a:bodyPr/>
+          <a:lstStyle/>
+          <a:p>
+            <a:pPr algn="ctr"/>
+            <a:endParaRPr lang="en-US" dirty="0"/>
+          </a:p>
+        </p:txBody>
+      </p:sp>
+      <p:pic>
+        <p:nvPicPr>
+          <p:cNvPr id="9" name="Content Placeholder 8" descr="Screen Shot 2015-09-09 at 22.38.00.png"/>
+          <p:cNvPicPr>
+            <a:picLocks noGrp="1" noChangeAspect="1"/>
+          </p:cNvPicPr>
+          <p:nvPr>
+            <p:ph idx="1"/>
+          </p:nvPr>
+        </p:nvPicPr>
+        <p:blipFill>
+          <a:blip r:embed="rId2">
+            <a:extLst>
+              <a:ext uri="{28A0092B-C50C-407E-A947-70E740481C1C}">
+                <a14:useLocalDpi xmlns:a14="http://schemas.microsoft.com/office/drawing/2010/main" val="0"/>
+              </a:ext>
+            </a:extLst>
+          </a:blip>
+          <a:srcRect t="6673" b="6673"/>
+          <a:stretch>
+            <a:fillRect/>
+          </a:stretch>
+        </p:blipFill>
+        <p:spPr>
+          <a:xfrm>
             <a:off x="1813137" y="2951238"/>
             <a:ext cx="5772995" cy="3174925"/>
           </a:xfrm>
@@ -4875,21 +5095,21 @@
           <a:lstStyle/>
           <a:p>
             <a:r>
-              <a:rPr lang="nl-NL" dirty="0" smtClean="0">
+              <a:rPr lang="nl-NL" dirty="0">
                 <a:latin typeface="Comic Sans MS"/>
                 <a:cs typeface="Comic Sans MS"/>
               </a:rPr>
               <a:t>Probeer nu zelf de bouwstenen te plaatsen zodat de </a:t>
             </a:r>
             <a:r>
-              <a:rPr lang="nl-NL" dirty="0" err="1" smtClean="0">
+              <a:rPr lang="nl-NL" dirty="0" err="1">
                 <a:latin typeface="Comic Sans MS"/>
                 <a:cs typeface="Comic Sans MS"/>
               </a:rPr>
               <a:t>sprite</a:t>
             </a:r>
             <a:r>
-              <a:rPr lang="nl-NL" dirty="0" smtClean="0">
+              <a:rPr lang="nl-NL" dirty="0">
                 <a:latin typeface="Comic Sans MS"/>
                 <a:cs typeface="Comic Sans MS"/>
               </a:rPr>
@@ -4908,7 +5128,7 @@
               <a:buChar char="•"/>
             </a:pPr>
             <a:r>
-              <a:rPr lang="nl-NL" dirty="0" smtClean="0">
+              <a:rPr lang="nl-NL" dirty="0">
                 <a:latin typeface="Comic Sans MS"/>
                 <a:cs typeface="Comic Sans MS"/>
               </a:rPr>
@@ -4921,16 +5141,12 @@
               <a:buChar char="•"/>
             </a:pPr>
             <a:r>
-              <a:rPr lang="nl-NL" dirty="0" smtClean="0">
+              <a:rPr lang="nl-NL" dirty="0">
                 <a:latin typeface="Comic Sans MS"/>
                 <a:cs typeface="Comic Sans MS"/>
               </a:rPr>
               <a:t>Bij pijltje naar beneden, 10 stappen omlaag gaat</a:t>
             </a:r>
-            <a:endParaRPr lang="nl-NL" dirty="0">
-              <a:latin typeface="Comic Sans MS"/>
-              <a:cs typeface="Comic Sans MS"/>
-            </a:endParaRPr>
           </a:p>
         </p:txBody>
       </p:sp>
@@ -4944,13 +5160,6 @@
   <p:clrMapOvr>
     <a:masterClrMapping/>
   </p:clrMapOvr>
-  <p:timing>
-    <p:tnLst>
-      <p:par>
-        <p:cTn xmlns:p14="http://schemas.microsoft.com/office/powerpoint/2010/main" id="1" dur="indefinite" restart="never" nodeType="tmRoot"/>
-      </p:par>
-    </p:tnLst>
-  </p:timing>
 </p:sld>
 </file>
 
@@ -4993,30 +5202,19 @@
           <a:p>
             <a:pPr algn="l"/>
             <a:r>
-              <a:rPr lang="en-US" dirty="0" err="1" smtClean="0">
+              <a:rPr lang="en-US" dirty="0" err="1">
                 <a:latin typeface="Comic Sans MS"/>
                 <a:cs typeface="Comic Sans MS"/>
               </a:rPr>
               <a:t>Opdracht</a:t>
             </a:r>
             <a:r>
-              <a:rPr lang="en-US" dirty="0" smtClean="0">
-                <a:latin typeface="Comic Sans MS"/>
-                <a:cs typeface="Comic Sans MS"/>
-              </a:rPr>
-              <a:t> 1</a:t>
-            </a:r>
-            <a:r>
-              <a:rPr lang="en-US" dirty="0" smtClean="0">
-                <a:latin typeface="Comic Sans MS"/>
-                <a:cs typeface="Comic Sans MS"/>
-              </a:rPr>
-              <a:t> </a:t>
-            </a:r>
-            <a:endParaRPr lang="en-US" dirty="0">
-              <a:latin typeface="Comic Sans MS"/>
-              <a:cs typeface="Comic Sans MS"/>
-            </a:endParaRPr>
+              <a:rPr lang="en-US" dirty="0">
+                <a:latin typeface="Comic Sans MS"/>
+                <a:cs typeface="Comic Sans MS"/>
+              </a:rPr>
+              <a:t> 1 </a:t>
+            </a:r>
           </a:p>
         </p:txBody>
       </p:sp>
@@ -5067,7 +5265,7 @@
       </p:sp>
       <p:pic>
         <p:nvPicPr>
-          <p:cNvPr id="10" name="Content Placeholder 9" descr="Screen Shot 2015-09-09 at 21.47.54.png"/>
+          <p:cNvPr id="10" name="Content Placeholder 9"/>
           <p:cNvPicPr>
             <a:picLocks noGrp="1" noChangeAspect="1"/>
           </p:cNvPicPr>
@@ -5076,22 +5274,15 @@
           </p:nvPr>
         </p:nvPicPr>
         <p:blipFill>
-          <a:blip r:embed="rId2">
-            <a:extLst>
-              <a:ext uri="{28A0092B-C50C-407E-A947-70E740481C1C}">
-                <a14:useLocalDpi xmlns:a14="http://schemas.microsoft.com/office/drawing/2010/main" val="0"/>
-              </a:ext>
-            </a:extLst>
-          </a:blip>
-          <a:srcRect t="6333" b="6333"/>
+          <a:blip r:embed="rId2"/>
           <a:stretch>
             <a:fillRect/>
           </a:stretch>
         </p:blipFill>
         <p:spPr>
           <a:xfrm>
-            <a:off x="2557464" y="1709057"/>
-            <a:ext cx="6129336" cy="3397337"/>
+            <a:off x="3124200" y="1709056"/>
+            <a:ext cx="5634538" cy="3171655"/>
           </a:xfrm>
         </p:spPr>
       </p:pic>
@@ -5104,7 +5295,7 @@
         <p:spPr>
           <a:xfrm>
             <a:off x="411239" y="1709056"/>
-            <a:ext cx="1964797" cy="2585323"/>
+            <a:ext cx="2395969" cy="3693319"/>
           </a:xfrm>
           <a:prstGeom prst="rect">
             <a:avLst/>
@@ -5118,11 +5309,11 @@
           <a:lstStyle/>
           <a:p>
             <a:r>
-              <a:rPr lang="nl-NL" dirty="0" smtClean="0">
-                <a:latin typeface="Comic Sans MS"/>
-                <a:cs typeface="Comic Sans MS"/>
-              </a:rPr>
-              <a:t>We beginnen met een nieuw project</a:t>
+              <a:rPr lang="nl-NL" dirty="0">
+                <a:latin typeface="Comic Sans MS"/>
+                <a:cs typeface="Comic Sans MS"/>
+              </a:rPr>
+              <a:t>Bij deze opdracht gaan we de Scratch-kat besturen met het toetsenbord.</a:t>
             </a:r>
           </a:p>
           <a:p>
@@ -5133,11 +5324,11 @@
           </a:p>
           <a:p>
             <a:r>
-              <a:rPr lang="nl-NL" dirty="0" smtClean="0">
-                <a:latin typeface="Comic Sans MS"/>
-                <a:cs typeface="Comic Sans MS"/>
-              </a:rPr>
-              <a:t>Dat doe je door in het menu te kiezen voor:</a:t>
+              <a:rPr lang="nl-NL" dirty="0">
+                <a:latin typeface="Comic Sans MS"/>
+                <a:cs typeface="Comic Sans MS"/>
+              </a:rPr>
+              <a:t>We beginnen met een nieuw project</a:t>
             </a:r>
           </a:p>
           <a:p>
@@ -5148,7 +5339,22 @@
           </a:p>
           <a:p>
             <a:r>
-              <a:rPr lang="nl-NL" dirty="0" smtClean="0">
+              <a:rPr lang="nl-NL" dirty="0">
+                <a:latin typeface="Comic Sans MS"/>
+                <a:cs typeface="Comic Sans MS"/>
+              </a:rPr>
+              <a:t>Dat doe je door in het menu te kiezen voor:</a:t>
+            </a:r>
+          </a:p>
+          <a:p>
+            <a:endParaRPr lang="nl-NL" dirty="0">
+              <a:latin typeface="Comic Sans MS"/>
+              <a:cs typeface="Comic Sans MS"/>
+            </a:endParaRPr>
+          </a:p>
+          <a:p>
+            <a:r>
+              <a:rPr lang="nl-NL" dirty="0">
                 <a:latin typeface="Comic Sans MS"/>
                 <a:cs typeface="Comic Sans MS"/>
               </a:rPr>
@@ -5167,13 +5373,6 @@
   <p:clrMapOvr>
     <a:masterClrMapping/>
   </p:clrMapOvr>
-  <p:timing>
-    <p:tnLst>
-      <p:par>
-        <p:cTn xmlns:p14="http://schemas.microsoft.com/office/powerpoint/2010/main" id="1" dur="indefinite" restart="never" nodeType="tmRoot"/>
-      </p:par>
-    </p:tnLst>
-  </p:timing>
 </p:sld>
 </file>
 
@@ -5216,30 +5415,19 @@
           <a:p>
             <a:pPr algn="l"/>
             <a:r>
-              <a:rPr lang="en-US" dirty="0" err="1" smtClean="0">
+              <a:rPr lang="en-US" dirty="0" err="1">
                 <a:latin typeface="Comic Sans MS"/>
                 <a:cs typeface="Comic Sans MS"/>
               </a:rPr>
               <a:t>Opdracht</a:t>
             </a:r>
             <a:r>
-              <a:rPr lang="en-US" dirty="0" smtClean="0">
-                <a:latin typeface="Comic Sans MS"/>
-                <a:cs typeface="Comic Sans MS"/>
-              </a:rPr>
-              <a:t> 1</a:t>
-            </a:r>
-            <a:r>
-              <a:rPr lang="en-US" dirty="0" smtClean="0">
-                <a:latin typeface="Comic Sans MS"/>
-                <a:cs typeface="Comic Sans MS"/>
-              </a:rPr>
-              <a:t> </a:t>
-            </a:r>
-            <a:endParaRPr lang="en-US" dirty="0">
-              <a:latin typeface="Comic Sans MS"/>
-              <a:cs typeface="Comic Sans MS"/>
-            </a:endParaRPr>
+              <a:rPr lang="en-US" dirty="0">
+                <a:latin typeface="Comic Sans MS"/>
+                <a:cs typeface="Comic Sans MS"/>
+              </a:rPr>
+              <a:t> 1 </a:t>
+            </a:r>
           </a:p>
         </p:txBody>
       </p:sp>
@@ -5290,14 +5478,14 @@
       </p:sp>
       <p:sp>
         <p:nvSpPr>
-          <p:cNvPr id="7" name="TextBox 6"/>
+          <p:cNvPr id="11" name="TextBox 10"/>
           <p:cNvSpPr txBox="1"/>
           <p:nvPr/>
         </p:nvSpPr>
         <p:spPr>
           <a:xfrm>
-            <a:off x="556382" y="1911048"/>
-            <a:ext cx="3507618" cy="2031325"/>
+            <a:off x="411239" y="1709056"/>
+            <a:ext cx="2395969" cy="3139321"/>
           </a:xfrm>
           <a:prstGeom prst="rect">
             <a:avLst/>
@@ -5311,28 +5499,39 @@
           <a:lstStyle/>
           <a:p>
             <a:r>
-              <a:rPr lang="nl-NL" dirty="0" smtClean="0">
-                <a:latin typeface="Comic Sans MS"/>
-                <a:cs typeface="Comic Sans MS"/>
-              </a:rPr>
-              <a:t>Klik op ‘</a:t>
-            </a:r>
-            <a:r>
-              <a:rPr lang="nl-NL" dirty="0" smtClean="0">
-                <a:solidFill>
-                  <a:srgbClr val="BC711C"/>
-                </a:solidFill>
-                <a:latin typeface="Comic Sans MS"/>
-                <a:cs typeface="Comic Sans MS"/>
-              </a:rPr>
-              <a:t>Gebeurtenissen</a:t>
-            </a:r>
-            <a:r>
-              <a:rPr lang="nl-NL" dirty="0" smtClean="0">
-                <a:latin typeface="Comic Sans MS"/>
-                <a:cs typeface="Comic Sans MS"/>
-              </a:rPr>
-              <a:t>’ bouwstenen.</a:t>
+              <a:rPr lang="nl-NL" dirty="0">
+                <a:latin typeface="Comic Sans MS"/>
+                <a:cs typeface="Comic Sans MS"/>
+              </a:rPr>
+              <a:t>Voeg een </a:t>
+            </a:r>
+            <a:r>
+              <a:rPr lang="nl-NL" dirty="0" err="1">
+                <a:latin typeface="Comic Sans MS"/>
+                <a:cs typeface="Comic Sans MS"/>
+              </a:rPr>
+              <a:t>sprite</a:t>
+            </a:r>
+            <a:r>
+              <a:rPr lang="nl-NL" dirty="0">
+                <a:latin typeface="Comic Sans MS"/>
+                <a:cs typeface="Comic Sans MS"/>
+              </a:rPr>
+              <a:t> met de Scratch-kat toe door op het mannetje bij “Nieuwe </a:t>
+            </a:r>
+            <a:r>
+              <a:rPr lang="nl-NL" dirty="0" err="1">
+                <a:latin typeface="Comic Sans MS"/>
+                <a:cs typeface="Comic Sans MS"/>
+              </a:rPr>
+              <a:t>sprite</a:t>
+            </a:r>
+            <a:r>
+              <a:rPr lang="nl-NL" dirty="0">
+                <a:latin typeface="Comic Sans MS"/>
+                <a:cs typeface="Comic Sans MS"/>
+              </a:rPr>
+              <a:t>” te klikken.</a:t>
             </a:r>
           </a:p>
           <a:p>
@@ -5343,39 +5542,38 @@
           </a:p>
           <a:p>
             <a:r>
-              <a:rPr lang="nl-NL" dirty="0" smtClean="0">
-                <a:latin typeface="Comic Sans MS"/>
-                <a:cs typeface="Comic Sans MS"/>
-              </a:rPr>
-              <a:t>Sleep dan de bouwsteen ‘</a:t>
-            </a:r>
-            <a:r>
-              <a:rPr lang="nl-NL" dirty="0" smtClean="0">
-                <a:solidFill>
-                  <a:srgbClr val="BC711C"/>
-                </a:solidFill>
-                <a:latin typeface="Comic Sans MS"/>
-                <a:cs typeface="Comic Sans MS"/>
-              </a:rPr>
-              <a:t>wanneer spatiebalk wordt ingedrukt</a:t>
-            </a:r>
-            <a:r>
-              <a:rPr lang="nl-NL" dirty="0" smtClean="0">
-                <a:latin typeface="Comic Sans MS"/>
-                <a:cs typeface="Comic Sans MS"/>
-              </a:rPr>
-              <a:t>’ naar het programma veld.</a:t>
-            </a:r>
-            <a:endParaRPr lang="nl-NL" dirty="0">
-              <a:latin typeface="Comic Sans MS"/>
-              <a:cs typeface="Comic Sans MS"/>
-            </a:endParaRPr>
+              <a:rPr lang="nl-NL" dirty="0">
+                <a:latin typeface="Comic Sans MS"/>
+                <a:cs typeface="Comic Sans MS"/>
+              </a:rPr>
+              <a:t>Zoek in de lijst </a:t>
+            </a:r>
+            <a:r>
+              <a:rPr lang="nl-NL" dirty="0" err="1">
+                <a:latin typeface="Comic Sans MS"/>
+                <a:cs typeface="Comic Sans MS"/>
+              </a:rPr>
+              <a:t>sprites</a:t>
+            </a:r>
+            <a:r>
+              <a:rPr lang="nl-NL" dirty="0">
+                <a:latin typeface="Comic Sans MS"/>
+                <a:cs typeface="Comic Sans MS"/>
+              </a:rPr>
+              <a:t> de kat op met naam “Cat1” en klik op “OK”.</a:t>
+            </a:r>
           </a:p>
         </p:txBody>
       </p:sp>
       <p:pic>
         <p:nvPicPr>
-          <p:cNvPr id="13" name="Content Placeholder 12" descr="Screen Shot 2015-09-09 at 22.08.06.png"/>
+          <p:cNvPr id="8" name="Content Placeholder 7">
+            <a:extLst>
+              <a:ext uri="{FF2B5EF4-FFF2-40B4-BE49-F238E27FC236}">
+                <a16:creationId xmlns:a16="http://schemas.microsoft.com/office/drawing/2014/main" id="{CCD5635C-FF5E-DC4C-88DB-68CA0B3A2D6E}"/>
+              </a:ext>
+            </a:extLst>
+          </p:cNvPr>
           <p:cNvPicPr>
             <a:picLocks noGrp="1" noChangeAspect="1"/>
           </p:cNvPicPr>
@@ -5383,41 +5581,58 @@
             <p:ph idx="1"/>
           </p:nvPr>
         </p:nvPicPr>
-        <p:blipFill rotWithShape="1">
-          <a:blip r:embed="rId2">
+        <p:blipFill>
+          <a:blip r:embed="rId2"/>
+          <a:stretch>
+            <a:fillRect/>
+          </a:stretch>
+        </p:blipFill>
+        <p:spPr>
+          <a:xfrm>
+            <a:off x="3467100" y="1798161"/>
+            <a:ext cx="3086100" cy="1295400"/>
+          </a:xfrm>
+        </p:spPr>
+      </p:pic>
+      <p:pic>
+        <p:nvPicPr>
+          <p:cNvPr id="12" name="Picture 11">
             <a:extLst>
-              <a:ext uri="{28A0092B-C50C-407E-A947-70E740481C1C}">
-                <a14:useLocalDpi xmlns:a14="http://schemas.microsoft.com/office/drawing/2010/main" val="0"/>
+              <a:ext uri="{FF2B5EF4-FFF2-40B4-BE49-F238E27FC236}">
+                <a16:creationId xmlns:a16="http://schemas.microsoft.com/office/drawing/2014/main" id="{C94FBD56-CA23-F949-91E1-36F3659A9582}"/>
               </a:ext>
             </a:extLst>
-          </a:blip>
-          <a:srcRect t="-149" b="-370"/>
+          </p:cNvPr>
+          <p:cNvPicPr>
+            <a:picLocks noChangeAspect="1"/>
+          </p:cNvPicPr>
+          <p:nvPr/>
+        </p:nvPicPr>
+        <p:blipFill rotWithShape="1">
+          <a:blip r:embed="rId3"/>
+          <a:srcRect t="4287"/>
           <a:stretch/>
         </p:blipFill>
         <p:spPr>
           <a:xfrm>
-            <a:off x="4063999" y="1911048"/>
-            <a:ext cx="4655964" cy="3616476"/>
-          </a:xfrm>
+            <a:off x="3467100" y="3657600"/>
+            <a:ext cx="3647186" cy="2234817"/>
+          </a:xfrm>
+          <a:prstGeom prst="rect">
+            <a:avLst/>
+          </a:prstGeom>
         </p:spPr>
       </p:pic>
     </p:spTree>
     <p:extLst>
       <p:ext uri="{BB962C8B-B14F-4D97-AF65-F5344CB8AC3E}">
-        <p14:creationId xmlns:p14="http://schemas.microsoft.com/office/powerpoint/2010/main" val="1666396418"/>
+        <p14:creationId xmlns:p14="http://schemas.microsoft.com/office/powerpoint/2010/main" val="1103040630"/>
       </p:ext>
     </p:extLst>
   </p:cSld>
   <p:clrMapOvr>
     <a:masterClrMapping/>
   </p:clrMapOvr>
-  <p:timing>
-    <p:tnLst>
-      <p:par>
-        <p:cTn xmlns:p14="http://schemas.microsoft.com/office/powerpoint/2010/main" id="1" dur="indefinite" restart="never" nodeType="tmRoot"/>
-      </p:par>
-    </p:tnLst>
-  </p:timing>
 </p:sld>
 </file>
 
@@ -5460,30 +5675,19 @@
           <a:p>
             <a:pPr algn="l"/>
             <a:r>
-              <a:rPr lang="en-US" dirty="0" err="1" smtClean="0">
+              <a:rPr lang="en-US" dirty="0" err="1">
                 <a:latin typeface="Comic Sans MS"/>
                 <a:cs typeface="Comic Sans MS"/>
               </a:rPr>
               <a:t>Opdracht</a:t>
             </a:r>
             <a:r>
-              <a:rPr lang="en-US" dirty="0" smtClean="0">
-                <a:latin typeface="Comic Sans MS"/>
-                <a:cs typeface="Comic Sans MS"/>
-              </a:rPr>
-              <a:t> 1</a:t>
-            </a:r>
-            <a:r>
-              <a:rPr lang="en-US" dirty="0" smtClean="0">
-                <a:latin typeface="Comic Sans MS"/>
-                <a:cs typeface="Comic Sans MS"/>
-              </a:rPr>
-              <a:t> </a:t>
-            </a:r>
-            <a:endParaRPr lang="en-US" dirty="0">
-              <a:latin typeface="Comic Sans MS"/>
-              <a:cs typeface="Comic Sans MS"/>
-            </a:endParaRPr>
+              <a:rPr lang="en-US" dirty="0">
+                <a:latin typeface="Comic Sans MS"/>
+                <a:cs typeface="Comic Sans MS"/>
+              </a:rPr>
+              <a:t> 1 </a:t>
+            </a:r>
           </a:p>
         </p:txBody>
       </p:sp>
@@ -5540,8 +5744,8 @@
         </p:nvSpPr>
         <p:spPr>
           <a:xfrm>
-            <a:off x="495906" y="1898954"/>
-            <a:ext cx="3568094" cy="658426"/>
+            <a:off x="556382" y="1911048"/>
+            <a:ext cx="3507618" cy="2031325"/>
           </a:xfrm>
           <a:prstGeom prst="rect">
             <a:avLst/>
@@ -5555,22 +5759,67 @@
           <a:lstStyle/>
           <a:p>
             <a:r>
-              <a:rPr lang="nl-NL" dirty="0" smtClean="0">
-                <a:latin typeface="Comic Sans MS"/>
-                <a:cs typeface="Comic Sans MS"/>
-              </a:rPr>
-              <a:t>Klik op ‘spatiebalk’ en kies nu ‘pijltje rechts’</a:t>
-            </a:r>
+              <a:rPr lang="nl-NL" dirty="0">
+                <a:latin typeface="Comic Sans MS"/>
+                <a:cs typeface="Comic Sans MS"/>
+              </a:rPr>
+              <a:t>Klik op ‘</a:t>
+            </a:r>
+            <a:r>
+              <a:rPr lang="nl-NL" dirty="0">
+                <a:solidFill>
+                  <a:srgbClr val="BC711C"/>
+                </a:solidFill>
+                <a:latin typeface="Comic Sans MS"/>
+                <a:cs typeface="Comic Sans MS"/>
+              </a:rPr>
+              <a:t>Gebeurtenissen</a:t>
+            </a:r>
+            <a:r>
+              <a:rPr lang="nl-NL" dirty="0">
+                <a:latin typeface="Comic Sans MS"/>
+                <a:cs typeface="Comic Sans MS"/>
+              </a:rPr>
+              <a:t>’ bouwstenen.</a:t>
+            </a:r>
+          </a:p>
+          <a:p>
             <a:endParaRPr lang="nl-NL" dirty="0">
               <a:latin typeface="Comic Sans MS"/>
               <a:cs typeface="Comic Sans MS"/>
             </a:endParaRPr>
           </a:p>
+          <a:p>
+            <a:r>
+              <a:rPr lang="nl-NL" dirty="0">
+                <a:latin typeface="Comic Sans MS"/>
+                <a:cs typeface="Comic Sans MS"/>
+              </a:rPr>
+              <a:t>Sleep dan de bouwsteen ‘</a:t>
+            </a:r>
+            <a:r>
+              <a:rPr lang="nl-NL" dirty="0">
+                <a:solidFill>
+                  <a:srgbClr val="BC711C"/>
+                </a:solidFill>
+                <a:latin typeface="Comic Sans MS"/>
+                <a:cs typeface="Comic Sans MS"/>
+              </a:rPr>
+              <a:t>wanneer spatiebalk wordt ingedrukt</a:t>
+            </a:r>
+            <a:r>
+              <a:rPr lang="nl-NL" dirty="0">
+                <a:latin typeface="Comic Sans MS"/>
+                <a:cs typeface="Comic Sans MS"/>
+              </a:rPr>
+              <a:t>’ naar het programma veld.</a:t>
+            </a:r>
+          </a:p>
         </p:txBody>
       </p:sp>
       <p:pic>
         <p:nvPicPr>
-          <p:cNvPr id="6" name="Content Placeholder 5" descr="Screen Shot 2015-09-09 at 21.50.44.png"/>
+          <p:cNvPr id="13" name="Content Placeholder 12" descr="Screen Shot 2015-09-09 at 22.08.06.png"/>
           <p:cNvPicPr>
             <a:picLocks noGrp="1" noChangeAspect="1"/>
           </p:cNvPicPr>
@@ -5586,33 +5835,26 @@
               </a:ext>
             </a:extLst>
           </a:blip>
-          <a:srcRect t="-537" b="-36"/>
+          <a:srcRect t="-149" b="-370"/>
           <a:stretch/>
         </p:blipFill>
         <p:spPr>
           <a:xfrm>
-            <a:off x="4280565" y="1898953"/>
-            <a:ext cx="3970805" cy="3761618"/>
+            <a:off x="4063999" y="1911048"/>
+            <a:ext cx="4655964" cy="3616476"/>
           </a:xfrm>
         </p:spPr>
       </p:pic>
     </p:spTree>
     <p:extLst>
       <p:ext uri="{BB962C8B-B14F-4D97-AF65-F5344CB8AC3E}">
-        <p14:creationId xmlns:p14="http://schemas.microsoft.com/office/powerpoint/2010/main" val="2920945046"/>
+        <p14:creationId xmlns:p14="http://schemas.microsoft.com/office/powerpoint/2010/main" val="1666396418"/>
       </p:ext>
     </p:extLst>
   </p:cSld>
   <p:clrMapOvr>
     <a:masterClrMapping/>
   </p:clrMapOvr>
-  <p:timing>
-    <p:tnLst>
-      <p:par>
-        <p:cTn xmlns:p14="http://schemas.microsoft.com/office/powerpoint/2010/main" id="1" dur="indefinite" restart="never" nodeType="tmRoot"/>
-      </p:par>
-    </p:tnLst>
-  </p:timing>
 </p:sld>
 </file>
 
@@ -5655,30 +5897,19 @@
           <a:p>
             <a:pPr algn="l"/>
             <a:r>
-              <a:rPr lang="en-US" dirty="0" err="1" smtClean="0">
+              <a:rPr lang="en-US" dirty="0" err="1">
                 <a:latin typeface="Comic Sans MS"/>
                 <a:cs typeface="Comic Sans MS"/>
               </a:rPr>
               <a:t>Opdracht</a:t>
             </a:r>
             <a:r>
-              <a:rPr lang="en-US" dirty="0" smtClean="0">
-                <a:latin typeface="Comic Sans MS"/>
-                <a:cs typeface="Comic Sans MS"/>
-              </a:rPr>
-              <a:t> 1</a:t>
-            </a:r>
-            <a:r>
-              <a:rPr lang="en-US" dirty="0" smtClean="0">
-                <a:latin typeface="Comic Sans MS"/>
-                <a:cs typeface="Comic Sans MS"/>
-              </a:rPr>
-              <a:t> </a:t>
-            </a:r>
-            <a:endParaRPr lang="en-US" dirty="0">
-              <a:latin typeface="Comic Sans MS"/>
-              <a:cs typeface="Comic Sans MS"/>
-            </a:endParaRPr>
+              <a:rPr lang="en-US" dirty="0">
+                <a:latin typeface="Comic Sans MS"/>
+                <a:cs typeface="Comic Sans MS"/>
+              </a:rPr>
+              <a:t> 1 </a:t>
+            </a:r>
           </a:p>
         </p:txBody>
       </p:sp>
@@ -5735,8 +5966,8 @@
         </p:nvSpPr>
         <p:spPr>
           <a:xfrm>
-            <a:off x="471714" y="1911048"/>
-            <a:ext cx="3229429" cy="2585323"/>
+            <a:off x="495906" y="1898954"/>
+            <a:ext cx="3568094" cy="658426"/>
           </a:xfrm>
           <a:prstGeom prst="rect">
             <a:avLst/>
@@ -5754,96 +5985,14 @@
                 <a:latin typeface="Comic Sans MS"/>
                 <a:cs typeface="Comic Sans MS"/>
               </a:rPr>
-              <a:t>Klik op </a:t>
-            </a:r>
-            <a:r>
-              <a:rPr lang="nl-NL" dirty="0" smtClean="0">
-                <a:latin typeface="Comic Sans MS"/>
-                <a:cs typeface="Comic Sans MS"/>
-              </a:rPr>
-              <a:t>‘</a:t>
-            </a:r>
-            <a:r>
-              <a:rPr lang="nl-NL" dirty="0" smtClean="0">
-                <a:solidFill>
-                  <a:srgbClr val="3750CE"/>
-                </a:solidFill>
-                <a:latin typeface="Comic Sans MS"/>
-                <a:cs typeface="Comic Sans MS"/>
-              </a:rPr>
-              <a:t>Beweging</a:t>
-            </a:r>
-            <a:r>
-              <a:rPr lang="nl-NL" dirty="0" smtClean="0">
-                <a:latin typeface="Comic Sans MS"/>
-                <a:cs typeface="Comic Sans MS"/>
-              </a:rPr>
-              <a:t>’ </a:t>
-            </a:r>
-            <a:r>
-              <a:rPr lang="nl-NL" dirty="0">
-                <a:latin typeface="Comic Sans MS"/>
-                <a:cs typeface="Comic Sans MS"/>
-              </a:rPr>
-              <a:t>bouwstenen</a:t>
-            </a:r>
-            <a:r>
-              <a:rPr lang="nl-NL" dirty="0" smtClean="0">
-                <a:latin typeface="Comic Sans MS"/>
-                <a:cs typeface="Comic Sans MS"/>
-              </a:rPr>
-              <a:t>.</a:t>
-            </a:r>
-          </a:p>
-          <a:p>
-            <a:endParaRPr lang="nl-NL" dirty="0" smtClean="0">
-              <a:latin typeface="Comic Sans MS"/>
-              <a:cs typeface="Comic Sans MS"/>
-            </a:endParaRPr>
-          </a:p>
-          <a:p>
-            <a:r>
-              <a:rPr lang="nl-NL" dirty="0" smtClean="0">
-                <a:latin typeface="Comic Sans MS"/>
-                <a:cs typeface="Comic Sans MS"/>
-              </a:rPr>
-              <a:t>Sleep dan de bouwsteen ‘</a:t>
-            </a:r>
-            <a:r>
-              <a:rPr lang="nl-NL" dirty="0" smtClean="0">
-                <a:solidFill>
-                  <a:srgbClr val="3750CE"/>
-                </a:solidFill>
-                <a:latin typeface="Comic Sans MS"/>
-                <a:cs typeface="Comic Sans MS"/>
-              </a:rPr>
-              <a:t>richt naar 90 graden</a:t>
-            </a:r>
-            <a:r>
-              <a:rPr lang="nl-NL" dirty="0" smtClean="0">
-                <a:latin typeface="Comic Sans MS"/>
-                <a:cs typeface="Comic Sans MS"/>
-              </a:rPr>
-              <a:t>’ naar het programma veld onder de vorige bouwsteen.</a:t>
-            </a:r>
-          </a:p>
-          <a:p>
-            <a:endParaRPr lang="nl-NL" dirty="0">
-              <a:latin typeface="Comic Sans MS"/>
-              <a:cs typeface="Comic Sans MS"/>
-            </a:endParaRPr>
-          </a:p>
-          <a:p>
-            <a:endParaRPr lang="nl-NL" dirty="0">
-              <a:latin typeface="Comic Sans MS"/>
-              <a:cs typeface="Comic Sans MS"/>
-            </a:endParaRPr>
+              <a:t>Klik op ‘spatiebalk’ en kies nu ‘pijltje rechts’</a:t>
+            </a:r>
           </a:p>
         </p:txBody>
       </p:sp>
       <p:pic>
         <p:nvPicPr>
-          <p:cNvPr id="8" name="Content Placeholder 7" descr="Screen Shot 2015-09-09 at 21.51.28.png"/>
+          <p:cNvPr id="6" name="Content Placeholder 5" descr="Screen Shot 2015-09-09 at 21.50.44.png"/>
           <p:cNvPicPr>
             <a:picLocks noGrp="1" noChangeAspect="1"/>
           </p:cNvPicPr>
@@ -5859,33 +6008,26 @@
               </a:ext>
             </a:extLst>
           </a:blip>
-          <a:srcRect t="-442" b="-3672"/>
+          <a:srcRect t="-537" b="-36"/>
           <a:stretch/>
         </p:blipFill>
         <p:spPr>
           <a:xfrm>
-            <a:off x="3866640" y="1911048"/>
-            <a:ext cx="4820160" cy="3713238"/>
+            <a:off x="4280565" y="1898953"/>
+            <a:ext cx="3970805" cy="3761618"/>
           </a:xfrm>
         </p:spPr>
       </p:pic>
     </p:spTree>
     <p:extLst>
       <p:ext uri="{BB962C8B-B14F-4D97-AF65-F5344CB8AC3E}">
-        <p14:creationId xmlns:p14="http://schemas.microsoft.com/office/powerpoint/2010/main" val="3217946436"/>
+        <p14:creationId xmlns:p14="http://schemas.microsoft.com/office/powerpoint/2010/main" val="2920945046"/>
       </p:ext>
     </p:extLst>
   </p:cSld>
   <p:clrMapOvr>
     <a:masterClrMapping/>
   </p:clrMapOvr>
-  <p:timing>
-    <p:tnLst>
-      <p:par>
-        <p:cTn xmlns:p14="http://schemas.microsoft.com/office/powerpoint/2010/main" id="1" dur="indefinite" restart="never" nodeType="tmRoot"/>
-      </p:par>
-    </p:tnLst>
-  </p:timing>
 </p:sld>
 </file>
 
@@ -5928,30 +6070,19 @@
           <a:p>
             <a:pPr algn="l"/>
             <a:r>
-              <a:rPr lang="en-US" dirty="0" err="1" smtClean="0">
+              <a:rPr lang="en-US" dirty="0" err="1">
                 <a:latin typeface="Comic Sans MS"/>
                 <a:cs typeface="Comic Sans MS"/>
               </a:rPr>
               <a:t>Opdracht</a:t>
             </a:r>
             <a:r>
-              <a:rPr lang="en-US" dirty="0" smtClean="0">
-                <a:latin typeface="Comic Sans MS"/>
-                <a:cs typeface="Comic Sans MS"/>
-              </a:rPr>
-              <a:t> 1</a:t>
-            </a:r>
-            <a:r>
-              <a:rPr lang="en-US" dirty="0" smtClean="0">
-                <a:latin typeface="Comic Sans MS"/>
-                <a:cs typeface="Comic Sans MS"/>
-              </a:rPr>
-              <a:t> </a:t>
-            </a:r>
-            <a:endParaRPr lang="en-US" dirty="0">
-              <a:latin typeface="Comic Sans MS"/>
-              <a:cs typeface="Comic Sans MS"/>
-            </a:endParaRPr>
+              <a:rPr lang="en-US" dirty="0">
+                <a:latin typeface="Comic Sans MS"/>
+                <a:cs typeface="Comic Sans MS"/>
+              </a:rPr>
+              <a:t> 1 </a:t>
+            </a:r>
           </a:p>
         </p:txBody>
       </p:sp>
@@ -6008,8 +6139,8 @@
         </p:nvSpPr>
         <p:spPr>
           <a:xfrm>
-            <a:off x="447524" y="1777999"/>
-            <a:ext cx="3217333" cy="3693319"/>
+            <a:off x="471714" y="1911048"/>
+            <a:ext cx="3229429" cy="2585323"/>
           </a:xfrm>
           <a:prstGeom prst="rect">
             <a:avLst/>
@@ -6023,28 +6154,28 @@
           <a:lstStyle/>
           <a:p>
             <a:r>
-              <a:rPr lang="nl-NL" dirty="0" smtClean="0">
-                <a:latin typeface="Comic Sans MS"/>
-                <a:cs typeface="Comic Sans MS"/>
-              </a:rPr>
-              <a:t>Sleep nu de bouwsteen ‘</a:t>
-            </a:r>
-            <a:r>
-              <a:rPr lang="nl-NL" dirty="0" smtClean="0">
+              <a:rPr lang="nl-NL" dirty="0">
+                <a:latin typeface="Comic Sans MS"/>
+                <a:cs typeface="Comic Sans MS"/>
+              </a:rPr>
+              <a:t>Klik op ‘</a:t>
+            </a:r>
+            <a:r>
+              <a:rPr lang="nl-NL" dirty="0">
                 <a:solidFill>
                   <a:srgbClr val="3750CE"/>
                 </a:solidFill>
                 <a:latin typeface="Comic Sans MS"/>
                 <a:cs typeface="Comic Sans MS"/>
               </a:rPr>
-              <a:t>neem 10 stappen</a:t>
-            </a:r>
-            <a:r>
-              <a:rPr lang="nl-NL" dirty="0" smtClean="0">
-                <a:latin typeface="Comic Sans MS"/>
-                <a:cs typeface="Comic Sans MS"/>
-              </a:rPr>
-              <a:t>’ naar het programma veld onder de vorige bouwsteen.</a:t>
+              <a:t>Beweging</a:t>
+            </a:r>
+            <a:r>
+              <a:rPr lang="nl-NL" dirty="0">
+                <a:latin typeface="Comic Sans MS"/>
+                <a:cs typeface="Comic Sans MS"/>
+              </a:rPr>
+              <a:t>’ bouwstenen.</a:t>
             </a:r>
           </a:p>
           <a:p>
@@ -6054,32 +6185,29 @@
             </a:endParaRPr>
           </a:p>
           <a:p>
-            <a:endParaRPr lang="nl-NL" dirty="0" smtClean="0">
-              <a:latin typeface="Comic Sans MS"/>
-              <a:cs typeface="Comic Sans MS"/>
-            </a:endParaRPr>
-          </a:p>
-          <a:p>
-            <a:r>
-              <a:rPr lang="nl-NL" dirty="0" smtClean="0">
-                <a:latin typeface="Comic Sans MS"/>
-                <a:cs typeface="Comic Sans MS"/>
-              </a:rPr>
-              <a:t>Onze </a:t>
-            </a:r>
-            <a:r>
-              <a:rPr lang="nl-NL" dirty="0" err="1" smtClean="0">
-                <a:latin typeface="Comic Sans MS"/>
-                <a:cs typeface="Comic Sans MS"/>
-              </a:rPr>
-              <a:t>sprite</a:t>
-            </a:r>
-            <a:r>
-              <a:rPr lang="nl-NL" dirty="0" smtClean="0">
-                <a:latin typeface="Comic Sans MS"/>
-                <a:cs typeface="Comic Sans MS"/>
-              </a:rPr>
-              <a:t> zal nu 10 stappen naar rechts zetten iedere keer als we het pijltje naar rechts indrukken.</a:t>
+            <a:r>
+              <a:rPr lang="nl-NL" dirty="0">
+                <a:latin typeface="Comic Sans MS"/>
+                <a:cs typeface="Comic Sans MS"/>
+              </a:rPr>
+              <a:t>Sleep dan de bouwsteen ‘</a:t>
+            </a:r>
+            <a:r>
+              <a:rPr lang="nl-NL" dirty="0">
+                <a:solidFill>
+                  <a:srgbClr val="3750CE"/>
+                </a:solidFill>
+                <a:latin typeface="Comic Sans MS"/>
+                <a:cs typeface="Comic Sans MS"/>
+              </a:rPr>
+              <a:t>richt naar 90 graden</a:t>
+            </a:r>
+            <a:r>
+              <a:rPr lang="nl-NL" dirty="0">
+                <a:latin typeface="Comic Sans MS"/>
+                <a:cs typeface="Comic Sans MS"/>
+              </a:rPr>
+              <a:t>’ naar het programma veld onder de vorige bouwsteen.</a:t>
             </a:r>
           </a:p>
           <a:p>
@@ -6098,7 +6226,7 @@
       </p:sp>
       <p:pic>
         <p:nvPicPr>
-          <p:cNvPr id="6" name="Content Placeholder 5" descr="Screen Shot 2015-09-09 at 21.51.47.png"/>
+          <p:cNvPr id="8" name="Content Placeholder 7" descr="Screen Shot 2015-09-09 at 21.51.28.png"/>
           <p:cNvPicPr>
             <a:picLocks noGrp="1" noChangeAspect="1"/>
           </p:cNvPicPr>
@@ -6114,33 +6242,26 @@
               </a:ext>
             </a:extLst>
           </a:blip>
-          <a:srcRect t="-299" b="-52"/>
+          <a:srcRect t="-442" b="-3672"/>
           <a:stretch/>
         </p:blipFill>
         <p:spPr>
           <a:xfrm>
-            <a:off x="3925477" y="1777999"/>
-            <a:ext cx="4610510" cy="3697665"/>
+            <a:off x="3866640" y="1911048"/>
+            <a:ext cx="4820160" cy="3713238"/>
           </a:xfrm>
         </p:spPr>
       </p:pic>
     </p:spTree>
     <p:extLst>
       <p:ext uri="{BB962C8B-B14F-4D97-AF65-F5344CB8AC3E}">
-        <p14:creationId xmlns:p14="http://schemas.microsoft.com/office/powerpoint/2010/main" val="325215406"/>
+        <p14:creationId xmlns:p14="http://schemas.microsoft.com/office/powerpoint/2010/main" val="3217946436"/>
       </p:ext>
     </p:extLst>
   </p:cSld>
   <p:clrMapOvr>
     <a:masterClrMapping/>
   </p:clrMapOvr>
-  <p:timing>
-    <p:tnLst>
-      <p:par>
-        <p:cTn xmlns:p14="http://schemas.microsoft.com/office/powerpoint/2010/main" id="1" dur="indefinite" restart="never" nodeType="tmRoot"/>
-      </p:par>
-    </p:tnLst>
-  </p:timing>
 </p:sld>
 </file>
 
@@ -6183,30 +6304,19 @@
           <a:p>
             <a:pPr algn="l"/>
             <a:r>
-              <a:rPr lang="en-US" dirty="0" err="1" smtClean="0">
+              <a:rPr lang="en-US" dirty="0" err="1">
                 <a:latin typeface="Comic Sans MS"/>
                 <a:cs typeface="Comic Sans MS"/>
               </a:rPr>
               <a:t>Opdracht</a:t>
             </a:r>
             <a:r>
-              <a:rPr lang="en-US" dirty="0" smtClean="0">
-                <a:latin typeface="Comic Sans MS"/>
-                <a:cs typeface="Comic Sans MS"/>
-              </a:rPr>
-              <a:t> 1</a:t>
-            </a:r>
-            <a:r>
-              <a:rPr lang="en-US" dirty="0" smtClean="0">
-                <a:latin typeface="Comic Sans MS"/>
-                <a:cs typeface="Comic Sans MS"/>
-              </a:rPr>
-              <a:t> </a:t>
-            </a:r>
-            <a:endParaRPr lang="en-US" dirty="0">
-              <a:latin typeface="Comic Sans MS"/>
-              <a:cs typeface="Comic Sans MS"/>
-            </a:endParaRPr>
+              <a:rPr lang="en-US" dirty="0">
+                <a:latin typeface="Comic Sans MS"/>
+                <a:cs typeface="Comic Sans MS"/>
+              </a:rPr>
+              <a:t> 1 </a:t>
+            </a:r>
           </a:p>
         </p:txBody>
       </p:sp>
@@ -6263,8 +6373,8 @@
         </p:nvSpPr>
         <p:spPr>
           <a:xfrm>
-            <a:off x="459620" y="1911048"/>
-            <a:ext cx="3241524" cy="3693319"/>
+            <a:off x="447524" y="1777999"/>
+            <a:ext cx="3217333" cy="3693319"/>
           </a:xfrm>
           <a:prstGeom prst="rect">
             <a:avLst/>
@@ -6278,25 +6388,28 @@
           <a:lstStyle/>
           <a:p>
             <a:r>
-              <a:rPr lang="nl-NL" dirty="0" smtClean="0">
-                <a:latin typeface="Comic Sans MS"/>
-                <a:cs typeface="Comic Sans MS"/>
-              </a:rPr>
-              <a:t>Nu moet de </a:t>
-            </a:r>
-            <a:r>
-              <a:rPr lang="nl-NL" dirty="0" err="1" smtClean="0">
-                <a:latin typeface="Comic Sans MS"/>
-                <a:cs typeface="Comic Sans MS"/>
-              </a:rPr>
-              <a:t>sprite</a:t>
-            </a:r>
-            <a:r>
-              <a:rPr lang="nl-NL" dirty="0" smtClean="0">
-                <a:latin typeface="Comic Sans MS"/>
-                <a:cs typeface="Comic Sans MS"/>
-              </a:rPr>
-              <a:t> ook weer naar links.</a:t>
+              <a:rPr lang="nl-NL" dirty="0">
+                <a:latin typeface="Comic Sans MS"/>
+                <a:cs typeface="Comic Sans MS"/>
+              </a:rPr>
+              <a:t>Sleep nu de bouwsteen ‘</a:t>
+            </a:r>
+            <a:r>
+              <a:rPr lang="nl-NL" dirty="0">
+                <a:solidFill>
+                  <a:srgbClr val="3750CE"/>
+                </a:solidFill>
+                <a:latin typeface="Comic Sans MS"/>
+                <a:cs typeface="Comic Sans MS"/>
+              </a:rPr>
+              <a:t>neem 10 stappen</a:t>
+            </a:r>
+            <a:r>
+              <a:rPr lang="nl-NL" dirty="0">
+                <a:latin typeface="Comic Sans MS"/>
+                <a:cs typeface="Comic Sans MS"/>
+              </a:rPr>
+              <a:t>’ naar het programma veld onder de vorige bouwsteen.</a:t>
             </a:r>
           </a:p>
           <a:p>
@@ -6306,32 +6419,6 @@
             </a:endParaRPr>
           </a:p>
           <a:p>
-            <a:r>
-              <a:rPr lang="nl-NL" dirty="0" smtClean="0">
-                <a:latin typeface="Comic Sans MS"/>
-                <a:cs typeface="Comic Sans MS"/>
-              </a:rPr>
-              <a:t>Ga weer terug naar de ‘</a:t>
-            </a:r>
-            <a:r>
-              <a:rPr lang="nl-NL" dirty="0" smtClean="0">
-                <a:solidFill>
-                  <a:srgbClr val="BC711C"/>
-                </a:solidFill>
-                <a:latin typeface="Comic Sans MS"/>
-                <a:cs typeface="Comic Sans MS"/>
-              </a:rPr>
-              <a:t>Gebeurtenissen</a:t>
-            </a:r>
-            <a:r>
-              <a:rPr lang="nl-NL" dirty="0" smtClean="0">
-                <a:latin typeface="Comic Sans MS"/>
-                <a:cs typeface="Comic Sans MS"/>
-              </a:rPr>
-              <a:t>’ bouwstenen.</a:t>
-            </a:r>
-          </a:p>
-          <a:p>
             <a:endParaRPr lang="nl-NL" dirty="0">
               <a:latin typeface="Comic Sans MS"/>
               <a:cs typeface="Comic Sans MS"/>
@@ -6339,28 +6426,25 @@
           </a:p>
           <a:p>
             <a:r>
-              <a:rPr lang="nl-NL" dirty="0" smtClean="0">
-                <a:latin typeface="Comic Sans MS"/>
-                <a:cs typeface="Comic Sans MS"/>
-              </a:rPr>
-              <a:t>Sleep nog een </a:t>
-            </a:r>
-            <a:r>
-              <a:rPr lang="nl-NL" dirty="0" smtClean="0">
-                <a:solidFill>
-                  <a:srgbClr val="BC711C"/>
-                </a:solidFill>
-                <a:latin typeface="Comic Sans MS"/>
-                <a:cs typeface="Comic Sans MS"/>
-              </a:rPr>
-              <a:t>‘wanneer spatiebalk wordt ingedrukt</a:t>
-            </a:r>
-            <a:r>
-              <a:rPr lang="nl-NL" dirty="0" smtClean="0">
-                <a:latin typeface="Comic Sans MS"/>
-                <a:cs typeface="Comic Sans MS"/>
-              </a:rPr>
-              <a:t>’ bouwsteen naar het programmeer veld.</a:t>
+              <a:rPr lang="nl-NL" dirty="0">
+                <a:latin typeface="Comic Sans MS"/>
+                <a:cs typeface="Comic Sans MS"/>
+              </a:rPr>
+              <a:t>Onze </a:t>
+            </a:r>
+            <a:r>
+              <a:rPr lang="nl-NL" dirty="0" err="1">
+                <a:latin typeface="Comic Sans MS"/>
+                <a:cs typeface="Comic Sans MS"/>
+              </a:rPr>
+              <a:t>sprite</a:t>
+            </a:r>
+            <a:r>
+              <a:rPr lang="nl-NL" dirty="0">
+                <a:latin typeface="Comic Sans MS"/>
+                <a:cs typeface="Comic Sans MS"/>
+              </a:rPr>
+              <a:t> zal nu 10 stappen naar rechts zetten iedere keer als we het pijltje naar rechts indrukken.</a:t>
             </a:r>
           </a:p>
           <a:p>
@@ -6370,13 +6454,6 @@
             </a:endParaRPr>
           </a:p>
           <a:p>
-            <a:r>
-              <a:rPr lang="nl-NL" dirty="0" smtClean="0">
-                <a:latin typeface="Comic Sans MS"/>
-                <a:cs typeface="Comic Sans MS"/>
-              </a:rPr>
-              <a:t>Kies nu ‘pijltje links’</a:t>
-            </a:r>
             <a:endParaRPr lang="nl-NL" dirty="0">
               <a:latin typeface="Comic Sans MS"/>
               <a:cs typeface="Comic Sans MS"/>
@@ -6386,7 +6463,7 @@
       </p:sp>
       <p:pic>
         <p:nvPicPr>
-          <p:cNvPr id="8" name="Content Placeholder 7" descr="Screen Shot 2015-09-09 at 21.52.33.png"/>
+          <p:cNvPr id="6" name="Content Placeholder 5" descr="Screen Shot 2015-09-09 at 21.51.47.png"/>
           <p:cNvPicPr>
             <a:picLocks noGrp="1" noChangeAspect="1"/>
           </p:cNvPicPr>
@@ -6402,33 +6479,26 @@
               </a:ext>
             </a:extLst>
           </a:blip>
-          <a:srcRect t="-1546" b="66"/>
+          <a:srcRect t="-299" b="-52"/>
           <a:stretch/>
         </p:blipFill>
         <p:spPr>
           <a:xfrm>
-            <a:off x="3701143" y="1911048"/>
-            <a:ext cx="4827302" cy="4184951"/>
+            <a:off x="3925477" y="1777999"/>
+            <a:ext cx="4610510" cy="3697665"/>
           </a:xfrm>
         </p:spPr>
       </p:pic>
     </p:spTree>
     <p:extLst>
       <p:ext uri="{BB962C8B-B14F-4D97-AF65-F5344CB8AC3E}">
-        <p14:creationId xmlns:p14="http://schemas.microsoft.com/office/powerpoint/2010/main" val="1729187651"/>
+        <p14:creationId xmlns:p14="http://schemas.microsoft.com/office/powerpoint/2010/main" val="325215406"/>
       </p:ext>
     </p:extLst>
   </p:cSld>
   <p:clrMapOvr>
     <a:masterClrMapping/>
   </p:clrMapOvr>
-  <p:timing>
-    <p:tnLst>
-      <p:par>
-        <p:cTn xmlns:p14="http://schemas.microsoft.com/office/powerpoint/2010/main" id="1" dur="indefinite" restart="never" nodeType="tmRoot"/>
-      </p:par>
-    </p:tnLst>
-  </p:timing>
 </p:sld>
 </file>
 
@@ -6471,30 +6541,19 @@
           <a:p>
             <a:pPr algn="l"/>
             <a:r>
-              <a:rPr lang="en-US" dirty="0" err="1" smtClean="0">
+              <a:rPr lang="en-US" dirty="0" err="1">
                 <a:latin typeface="Comic Sans MS"/>
                 <a:cs typeface="Comic Sans MS"/>
               </a:rPr>
               <a:t>Opdracht</a:t>
             </a:r>
             <a:r>
-              <a:rPr lang="en-US" dirty="0" smtClean="0">
-                <a:latin typeface="Comic Sans MS"/>
-                <a:cs typeface="Comic Sans MS"/>
-              </a:rPr>
-              <a:t> 1</a:t>
-            </a:r>
-            <a:r>
-              <a:rPr lang="en-US" dirty="0" smtClean="0">
-                <a:latin typeface="Comic Sans MS"/>
-                <a:cs typeface="Comic Sans MS"/>
-              </a:rPr>
-              <a:t> </a:t>
-            </a:r>
-            <a:endParaRPr lang="en-US" dirty="0">
-              <a:latin typeface="Comic Sans MS"/>
-              <a:cs typeface="Comic Sans MS"/>
-            </a:endParaRPr>
+              <a:rPr lang="en-US" dirty="0">
+                <a:latin typeface="Comic Sans MS"/>
+                <a:cs typeface="Comic Sans MS"/>
+              </a:rPr>
+              <a:t> 1 </a:t>
+            </a:r>
           </a:p>
         </p:txBody>
       </p:sp>
@@ -6551,8 +6610,8 @@
         </p:nvSpPr>
         <p:spPr>
           <a:xfrm>
-            <a:off x="774096" y="1632858"/>
-            <a:ext cx="3096380" cy="4524316"/>
+            <a:off x="459620" y="1911048"/>
+            <a:ext cx="3241524" cy="3693319"/>
           </a:xfrm>
           <a:prstGeom prst="rect">
             <a:avLst/>
@@ -6566,74 +6625,25 @@
           <a:lstStyle/>
           <a:p>
             <a:r>
-              <a:rPr lang="nl-NL" dirty="0" smtClean="0">
-                <a:latin typeface="Comic Sans MS"/>
-                <a:cs typeface="Comic Sans MS"/>
-              </a:rPr>
-              <a:t>Ga weer terug naar de  ‘</a:t>
-            </a:r>
-            <a:r>
-              <a:rPr lang="nl-NL" dirty="0" smtClean="0">
-                <a:solidFill>
-                  <a:srgbClr val="3750CE"/>
-                </a:solidFill>
-                <a:latin typeface="Comic Sans MS"/>
-                <a:cs typeface="Comic Sans MS"/>
-              </a:rPr>
-              <a:t>Beweging</a:t>
-            </a:r>
-            <a:r>
-              <a:rPr lang="nl-NL" dirty="0" smtClean="0">
-                <a:latin typeface="Comic Sans MS"/>
-                <a:cs typeface="Comic Sans MS"/>
-              </a:rPr>
-              <a:t>’ </a:t>
-            </a:r>
-            <a:r>
               <a:rPr lang="nl-NL" dirty="0">
                 <a:latin typeface="Comic Sans MS"/>
                 <a:cs typeface="Comic Sans MS"/>
               </a:rPr>
-              <a:t>bouwstenen</a:t>
-            </a:r>
-            <a:r>
-              <a:rPr lang="nl-NL" dirty="0" smtClean="0">
-                <a:latin typeface="Comic Sans MS"/>
-                <a:cs typeface="Comic Sans MS"/>
-              </a:rPr>
-              <a:t>.</a:t>
-            </a:r>
-          </a:p>
-          <a:p>
-            <a:endParaRPr lang="nl-NL" dirty="0" smtClean="0">
-              <a:latin typeface="Comic Sans MS"/>
-              <a:cs typeface="Comic Sans MS"/>
-            </a:endParaRPr>
-          </a:p>
-          <a:p>
-            <a:r>
-              <a:rPr lang="nl-NL" dirty="0" smtClean="0">
-                <a:latin typeface="Comic Sans MS"/>
-                <a:cs typeface="Comic Sans MS"/>
-              </a:rPr>
-              <a:t>Sleep dan de bouwsteen ‘</a:t>
-            </a:r>
-            <a:r>
-              <a:rPr lang="nl-NL" dirty="0" smtClean="0">
-                <a:solidFill>
-                  <a:srgbClr val="3750CE"/>
-                </a:solidFill>
-                <a:latin typeface="Comic Sans MS"/>
-                <a:cs typeface="Comic Sans MS"/>
-              </a:rPr>
-              <a:t>richt naar 90 graden</a:t>
-            </a:r>
-            <a:r>
-              <a:rPr lang="nl-NL" dirty="0" smtClean="0">
-                <a:latin typeface="Comic Sans MS"/>
-                <a:cs typeface="Comic Sans MS"/>
-              </a:rPr>
-              <a:t>’ naar het programma veld onder de vorige bouwsteen.</a:t>
+              <a:t>Nu moet de </a:t>
+            </a:r>
+            <a:r>
+              <a:rPr lang="nl-NL" dirty="0" err="1">
+                <a:latin typeface="Comic Sans MS"/>
+                <a:cs typeface="Comic Sans MS"/>
+              </a:rPr>
+              <a:t>sprite</a:t>
+            </a:r>
+            <a:r>
+              <a:rPr lang="nl-NL" dirty="0">
+                <a:latin typeface="Comic Sans MS"/>
+                <a:cs typeface="Comic Sans MS"/>
+              </a:rPr>
+              <a:t> ook weer naar links.</a:t>
             </a:r>
           </a:p>
           <a:p>
@@ -6644,25 +6654,28 @@
           </a:p>
           <a:p>
             <a:r>
-              <a:rPr lang="nl-NL" dirty="0" smtClean="0">
-                <a:latin typeface="Comic Sans MS"/>
-                <a:cs typeface="Comic Sans MS"/>
-              </a:rPr>
-              <a:t>Klik op </a:t>
-            </a:r>
-            <a:r>
-              <a:rPr lang="fr-FR" dirty="0" smtClean="0">
-                <a:latin typeface="Comic Sans MS"/>
-                <a:cs typeface="Comic Sans MS"/>
-              </a:rPr>
-              <a:t>’</a:t>
-            </a:r>
-            <a:r>
-              <a:rPr lang="nl-NL" dirty="0" smtClean="0">
-                <a:latin typeface="Comic Sans MS"/>
-                <a:cs typeface="Comic Sans MS"/>
-              </a:rPr>
-              <a:t>90’ en kies ‘(-90) links’</a:t>
+              <a:rPr lang="nl-NL" dirty="0">
+                <a:latin typeface="Comic Sans MS"/>
+                <a:cs typeface="Comic Sans MS"/>
+              </a:rPr>
+              <a:t>Ga weer terug naar de ‘</a:t>
+            </a:r>
+            <a:r>
+              <a:rPr lang="nl-NL" dirty="0">
+                <a:solidFill>
+                  <a:srgbClr val="BC711C"/>
+                </a:solidFill>
+                <a:latin typeface="Comic Sans MS"/>
+                <a:cs typeface="Comic Sans MS"/>
+              </a:rPr>
+              <a:t>Gebeurtenissen</a:t>
+            </a:r>
+            <a:r>
+              <a:rPr lang="nl-NL" dirty="0">
+                <a:latin typeface="Comic Sans MS"/>
+                <a:cs typeface="Comic Sans MS"/>
+              </a:rPr>
+              <a:t>’ bouwstenen.</a:t>
             </a:r>
           </a:p>
           <a:p>
@@ -6673,28 +6686,28 @@
           </a:p>
           <a:p>
             <a:r>
-              <a:rPr lang="nl-NL" dirty="0" smtClean="0">
-                <a:latin typeface="Comic Sans MS"/>
-                <a:cs typeface="Comic Sans MS"/>
-              </a:rPr>
-              <a:t>Sleep nog een bouwsteen ‘</a:t>
-            </a:r>
-            <a:r>
-              <a:rPr lang="nl-NL" dirty="0" smtClean="0">
+              <a:rPr lang="nl-NL" dirty="0">
+                <a:latin typeface="Comic Sans MS"/>
+                <a:cs typeface="Comic Sans MS"/>
+              </a:rPr>
+              <a:t>Sleep nog een </a:t>
+            </a:r>
+            <a:r>
+              <a:rPr lang="nl-NL" dirty="0">
                 <a:solidFill>
-                  <a:srgbClr val="3750CE"/>
+                  <a:srgbClr val="BC711C"/>
                 </a:solidFill>
                 <a:latin typeface="Comic Sans MS"/>
                 <a:cs typeface="Comic Sans MS"/>
               </a:rPr>
-              <a:t>neem 10 stappen</a:t>
-            </a:r>
-            <a:r>
-              <a:rPr lang="nl-NL" dirty="0" smtClean="0">
-                <a:latin typeface="Comic Sans MS"/>
-                <a:cs typeface="Comic Sans MS"/>
-              </a:rPr>
-              <a:t>’ onder de vorige bouwsteen.</a:t>
+              <a:t>‘wanneer spatiebalk wordt ingedrukt</a:t>
+            </a:r>
+            <a:r>
+              <a:rPr lang="nl-NL" dirty="0">
+                <a:latin typeface="Comic Sans MS"/>
+                <a:cs typeface="Comic Sans MS"/>
+              </a:rPr>
+              <a:t>’ bouwsteen naar het programmeer veld.</a:t>
             </a:r>
           </a:p>
           <a:p>
@@ -6704,16 +6717,19 @@
             </a:endParaRPr>
           </a:p>
           <a:p>
-            <a:endParaRPr lang="nl-NL" dirty="0">
-              <a:latin typeface="Comic Sans MS"/>
-              <a:cs typeface="Comic Sans MS"/>
-            </a:endParaRPr>
+            <a:r>
+              <a:rPr lang="nl-NL" dirty="0">
+                <a:latin typeface="Comic Sans MS"/>
+                <a:cs typeface="Comic Sans MS"/>
+              </a:rPr>
+              <a:t>Kies nu ‘pijltje links’</a:t>
+            </a:r>
           </a:p>
         </p:txBody>
       </p:sp>
       <p:pic>
         <p:nvPicPr>
-          <p:cNvPr id="6" name="Content Placeholder 5" descr="Screen Shot 2015-09-09 at 21.53.42.png"/>
+          <p:cNvPr id="8" name="Content Placeholder 7" descr="Screen Shot 2015-09-09 at 21.52.33.png"/>
           <p:cNvPicPr>
             <a:picLocks noGrp="1" noChangeAspect="1"/>
           </p:cNvPicPr>
@@ -6729,33 +6745,26 @@
               </a:ext>
             </a:extLst>
           </a:blip>
-          <a:srcRect t="-1476" b="-378"/>
+          <a:srcRect t="-1546" b="66"/>
           <a:stretch/>
         </p:blipFill>
         <p:spPr>
           <a:xfrm>
-            <a:off x="4192697" y="1632858"/>
-            <a:ext cx="4409436" cy="3930951"/>
+            <a:off x="3701143" y="1911048"/>
+            <a:ext cx="4827302" cy="4184951"/>
           </a:xfrm>
         </p:spPr>
       </p:pic>
     </p:spTree>
     <p:extLst>
       <p:ext uri="{BB962C8B-B14F-4D97-AF65-F5344CB8AC3E}">
-        <p14:creationId xmlns:p14="http://schemas.microsoft.com/office/powerpoint/2010/main" val="2094210998"/>
+        <p14:creationId xmlns:p14="http://schemas.microsoft.com/office/powerpoint/2010/main" val="1729187651"/>
       </p:ext>
     </p:extLst>
   </p:cSld>
   <p:clrMapOvr>
     <a:masterClrMapping/>
   </p:clrMapOvr>
-  <p:timing>
-    <p:tnLst>
-      <p:par>
-        <p:cTn xmlns:p14="http://schemas.microsoft.com/office/powerpoint/2010/main" id="1" dur="indefinite" restart="never" nodeType="tmRoot"/>
-      </p:par>
-    </p:tnLst>
-  </p:timing>
 </p:sld>
 </file>
 
@@ -6798,30 +6807,19 @@
           <a:p>
             <a:pPr algn="l"/>
             <a:r>
-              <a:rPr lang="en-US" dirty="0" err="1" smtClean="0">
+              <a:rPr lang="en-US" dirty="0" err="1">
                 <a:latin typeface="Comic Sans MS"/>
                 <a:cs typeface="Comic Sans MS"/>
               </a:rPr>
               <a:t>Opdracht</a:t>
             </a:r>
             <a:r>
-              <a:rPr lang="en-US" dirty="0" smtClean="0">
-                <a:latin typeface="Comic Sans MS"/>
-                <a:cs typeface="Comic Sans MS"/>
-              </a:rPr>
-              <a:t> 1</a:t>
-            </a:r>
-            <a:r>
-              <a:rPr lang="en-US" dirty="0" smtClean="0">
-                <a:latin typeface="Comic Sans MS"/>
-                <a:cs typeface="Comic Sans MS"/>
-              </a:rPr>
-              <a:t> </a:t>
-            </a:r>
-            <a:endParaRPr lang="en-US" dirty="0">
-              <a:latin typeface="Comic Sans MS"/>
-              <a:cs typeface="Comic Sans MS"/>
-            </a:endParaRPr>
+              <a:rPr lang="en-US" dirty="0">
+                <a:latin typeface="Comic Sans MS"/>
+                <a:cs typeface="Comic Sans MS"/>
+              </a:rPr>
+              <a:t> 1 </a:t>
+            </a:r>
           </a:p>
         </p:txBody>
       </p:sp>
@@ -6878,8 +6876,8 @@
         </p:nvSpPr>
         <p:spPr>
           <a:xfrm>
-            <a:off x="471714" y="1911048"/>
-            <a:ext cx="3229429" cy="2862323"/>
+            <a:off x="774096" y="1632858"/>
+            <a:ext cx="3096380" cy="4524316"/>
           </a:xfrm>
           <a:prstGeom prst="rect">
             <a:avLst/>
@@ -6893,93 +6891,61 @@
           <a:lstStyle/>
           <a:p>
             <a:r>
-              <a:rPr lang="nl-NL" dirty="0" smtClean="0">
-                <a:latin typeface="Comic Sans MS"/>
-                <a:cs typeface="Comic Sans MS"/>
-              </a:rPr>
-              <a:t>We moeten nu nog alleen zorgen dat de </a:t>
-            </a:r>
-            <a:r>
-              <a:rPr lang="nl-NL" dirty="0" err="1" smtClean="0">
-                <a:latin typeface="Comic Sans MS"/>
-                <a:cs typeface="Comic Sans MS"/>
-              </a:rPr>
-              <a:t>sprite</a:t>
-            </a:r>
-            <a:r>
-              <a:rPr lang="nl-NL" dirty="0" smtClean="0">
-                <a:latin typeface="Comic Sans MS"/>
-                <a:cs typeface="Comic Sans MS"/>
-              </a:rPr>
-              <a:t> op de juiste manier omdraait.</a:t>
-            </a:r>
-          </a:p>
-          <a:p>
-            <a:endParaRPr lang="nl-NL" dirty="0" smtClean="0">
-              <a:latin typeface="Comic Sans MS"/>
-              <a:cs typeface="Comic Sans MS"/>
-            </a:endParaRPr>
-          </a:p>
-          <a:p>
-            <a:r>
-              <a:rPr lang="nl-NL" dirty="0" smtClean="0">
-                <a:latin typeface="Comic Sans MS"/>
-                <a:cs typeface="Comic Sans MS"/>
-              </a:rPr>
-              <a:t>Klik op het blauwe i-</a:t>
-            </a:r>
-            <a:r>
-              <a:rPr lang="nl-NL" dirty="0" err="1" smtClean="0">
-                <a:latin typeface="Comic Sans MS"/>
-                <a:cs typeface="Comic Sans MS"/>
-              </a:rPr>
-              <a:t>tje</a:t>
-            </a:r>
-            <a:r>
-              <a:rPr lang="nl-NL" dirty="0" smtClean="0">
-                <a:latin typeface="Comic Sans MS"/>
-                <a:cs typeface="Comic Sans MS"/>
-              </a:rPr>
-              <a:t> naast de </a:t>
-            </a:r>
-            <a:r>
-              <a:rPr lang="nl-NL" dirty="0" err="1" smtClean="0">
-                <a:latin typeface="Comic Sans MS"/>
-                <a:cs typeface="Comic Sans MS"/>
-              </a:rPr>
-              <a:t>sprite</a:t>
-            </a:r>
-            <a:r>
-              <a:rPr lang="nl-NL" dirty="0" smtClean="0">
-                <a:latin typeface="Comic Sans MS"/>
-                <a:cs typeface="Comic Sans MS"/>
-              </a:rPr>
-              <a:t> in het </a:t>
-            </a:r>
-            <a:r>
-              <a:rPr lang="nl-NL" dirty="0" err="1" smtClean="0">
-                <a:latin typeface="Comic Sans MS"/>
-                <a:cs typeface="Comic Sans MS"/>
-              </a:rPr>
-              <a:t>sprite</a:t>
-            </a:r>
-            <a:r>
-              <a:rPr lang="nl-NL" dirty="0" smtClean="0">
-                <a:latin typeface="Comic Sans MS"/>
-                <a:cs typeface="Comic Sans MS"/>
-              </a:rPr>
-              <a:t> scherm.</a:t>
-            </a:r>
+              <a:rPr lang="nl-NL" dirty="0">
+                <a:latin typeface="Comic Sans MS"/>
+                <a:cs typeface="Comic Sans MS"/>
+              </a:rPr>
+              <a:t>Ga weer terug naar de  ‘</a:t>
+            </a:r>
+            <a:r>
+              <a:rPr lang="nl-NL" dirty="0">
+                <a:solidFill>
+                  <a:srgbClr val="3750CE"/>
+                </a:solidFill>
+                <a:latin typeface="Comic Sans MS"/>
+                <a:cs typeface="Comic Sans MS"/>
+              </a:rPr>
+              <a:t>Beweging</a:t>
+            </a:r>
+            <a:r>
+              <a:rPr lang="nl-NL" dirty="0">
+                <a:latin typeface="Comic Sans MS"/>
+                <a:cs typeface="Comic Sans MS"/>
+              </a:rPr>
+              <a:t>’ bouwstenen.</a:t>
+            </a:r>
+          </a:p>
+          <a:p>
             <a:endParaRPr lang="nl-NL" dirty="0">
               <a:latin typeface="Comic Sans MS"/>
               <a:cs typeface="Comic Sans MS"/>
             </a:endParaRPr>
           </a:p>
           <a:p>
-            <a:endParaRPr lang="nl-NL" dirty="0" smtClean="0">
-              <a:latin typeface="Comic Sans MS"/>
-              <a:cs typeface="Comic Sans MS"/>
-            </a:endParaRPr>
+            <a:r>
+              <a:rPr lang="nl-NL" dirty="0">
+                <a:latin typeface="Comic Sans MS"/>
+                <a:cs typeface="Comic Sans MS"/>
+              </a:rPr>
+              <a:t>Sleep dan de bouwsteen ‘</a:t>
+            </a:r>
+            <a:r>
+              <a:rPr lang="nl-NL" dirty="0">
+                <a:solidFill>
+                  <a:srgbClr val="3750CE"/>
+                </a:solidFill>
+                <a:latin typeface="Comic Sans MS"/>
+                <a:cs typeface="Comic Sans MS"/>
+              </a:rPr>
+              <a:t>richt naar 90 graden</a:t>
+            </a:r>
+            <a:r>
+              <a:rPr lang="nl-NL" dirty="0">
+                <a:latin typeface="Comic Sans MS"/>
+                <a:cs typeface="Comic Sans MS"/>
+              </a:rPr>
+              <a:t>’ naar het programma veld onder de vorige bouwsteen.</a:t>
+            </a:r>
           </a:p>
           <a:p>
             <a:endParaRPr lang="nl-NL" dirty="0">
@@ -6988,16 +6954,77 @@
             </a:endParaRPr>
           </a:p>
           <a:p>
+            <a:r>
+              <a:rPr lang="nl-NL" dirty="0">
+                <a:latin typeface="Comic Sans MS"/>
+                <a:cs typeface="Comic Sans MS"/>
+              </a:rPr>
+              <a:t>Klik op </a:t>
+            </a:r>
+            <a:r>
+              <a:rPr lang="fr-FR" dirty="0">
+                <a:latin typeface="Comic Sans MS"/>
+                <a:cs typeface="Comic Sans MS"/>
+              </a:rPr>
+              <a:t>’</a:t>
+            </a:r>
+            <a:r>
+              <a:rPr lang="nl-NL" dirty="0">
+                <a:latin typeface="Comic Sans MS"/>
+                <a:cs typeface="Comic Sans MS"/>
+              </a:rPr>
+              <a:t>90’ en kies ‘(-90) links’</a:t>
+            </a:r>
+          </a:p>
+          <a:p>
             <a:endParaRPr lang="nl-NL" dirty="0">
               <a:latin typeface="Comic Sans MS"/>
               <a:cs typeface="Comic Sans MS"/>
             </a:endParaRPr>
           </a:p>
+          <a:p>
+            <a:r>
+              <a:rPr lang="nl-NL" dirty="0">
+                <a:latin typeface="Comic Sans MS"/>
+                <a:cs typeface="Comic Sans MS"/>
+              </a:rPr>
+              <a:t>Sleep nog een bouwsteen ‘</a:t>
+            </a:r>
+            <a:r>
+              <a:rPr lang="nl-NL" dirty="0">
+                <a:solidFill>
+                  <a:srgbClr val="3750CE"/>
+                </a:solidFill>
+                <a:latin typeface="Comic Sans MS"/>
+                <a:cs typeface="Comic Sans MS"/>
+              </a:rPr>
+              <a:t>neem 10 stappen</a:t>
+            </a:r>
+            <a:r>
+              <a:rPr lang="nl-NL" dirty="0">
+                <a:latin typeface="Comic Sans MS"/>
+                <a:cs typeface="Comic Sans MS"/>
+              </a:rPr>
+              <a:t>’ onder de vorige bouwsteen.</a:t>
+            </a:r>
+          </a:p>
+          <a:p>
+            <a:endParaRPr lang="nl-NL" dirty="0">
+              <a:latin typeface="Comic Sans MS"/>
+              <a:cs typeface="Comic Sans MS"/>
+            </a:endParaRPr>
+          </a:p>
+          <a:p>
+            <a:endParaRPr lang="nl-NL" dirty="0">
+              <a:latin typeface="Comic Sans MS"/>
+              <a:cs typeface="Comic Sans MS"/>
+            </a:endParaRPr>
+          </a:p>
         </p:txBody>
       </p:sp>
       <p:pic>
         <p:nvPicPr>
-          <p:cNvPr id="6" name="Content Placeholder 5" descr="Screen Shot 2015-09-09 at 21.55.50.png"/>
+          <p:cNvPr id="6" name="Content Placeholder 5" descr="Screen Shot 2015-09-09 at 21.53.42.png"/>
           <p:cNvPicPr>
             <a:picLocks noGrp="1" noChangeAspect="1"/>
           </p:cNvPicPr>
@@ -7013,33 +7040,26 @@
               </a:ext>
             </a:extLst>
           </a:blip>
-          <a:srcRect l="-955" r="-464"/>
+          <a:srcRect t="-1476" b="-378"/>
           <a:stretch/>
         </p:blipFill>
         <p:spPr>
           <a:xfrm>
-            <a:off x="3580189" y="1911048"/>
-            <a:ext cx="5285619" cy="2376639"/>
+            <a:off x="4192697" y="1632858"/>
+            <a:ext cx="4409436" cy="3930951"/>
           </a:xfrm>
         </p:spPr>
       </p:pic>
     </p:spTree>
     <p:extLst>
       <p:ext uri="{BB962C8B-B14F-4D97-AF65-F5344CB8AC3E}">
-        <p14:creationId xmlns:p14="http://schemas.microsoft.com/office/powerpoint/2010/main" val="3014098830"/>
+        <p14:creationId xmlns:p14="http://schemas.microsoft.com/office/powerpoint/2010/main" val="2094210998"/>
       </p:ext>
     </p:extLst>
   </p:cSld>
   <p:clrMapOvr>
     <a:masterClrMapping/>
   </p:clrMapOvr>
-  <p:timing>
-    <p:tnLst>
-      <p:par>
-        <p:cTn xmlns:p14="http://schemas.microsoft.com/office/powerpoint/2010/main" id="1" dur="indefinite" restart="never" nodeType="tmRoot"/>
-      </p:par>
-    </p:tnLst>
-  </p:timing>
 </p:sld>
 </file>
 

</xml_diff>